<commit_message>
Added AWS ElasticBeanstalk and ASP.NET Core Demo Apps
</commit_message>
<xml_diff>
--- a/api-engineering-cloud-computing/comp306_classactivity_01_ec2instances.pptx
+++ b/api-engineering-cloud-computing/comp306_classactivity_01_ec2instances.pptx
@@ -5,41 +5,42 @@
     <p:sldMasterId id="2147483648" r:id="rId1"/>
   </p:sldMasterIdLst>
   <p:notesMasterIdLst>
-    <p:notesMasterId r:id="rId34"/>
+    <p:notesMasterId r:id="rId35"/>
   </p:notesMasterIdLst>
   <p:sldIdLst>
     <p:sldId id="256" r:id="rId2"/>
-    <p:sldId id="278" r:id="rId3"/>
-    <p:sldId id="257" r:id="rId4"/>
-    <p:sldId id="258" r:id="rId5"/>
-    <p:sldId id="259" r:id="rId6"/>
-    <p:sldId id="260" r:id="rId7"/>
-    <p:sldId id="261" r:id="rId8"/>
-    <p:sldId id="279" r:id="rId9"/>
-    <p:sldId id="262" r:id="rId10"/>
-    <p:sldId id="263" r:id="rId11"/>
-    <p:sldId id="264" r:id="rId12"/>
-    <p:sldId id="265" r:id="rId13"/>
-    <p:sldId id="266" r:id="rId14"/>
-    <p:sldId id="267" r:id="rId15"/>
-    <p:sldId id="269" r:id="rId16"/>
-    <p:sldId id="268" r:id="rId17"/>
-    <p:sldId id="270" r:id="rId18"/>
-    <p:sldId id="271" r:id="rId19"/>
-    <p:sldId id="272" r:id="rId20"/>
-    <p:sldId id="273" r:id="rId21"/>
-    <p:sldId id="274" r:id="rId22"/>
-    <p:sldId id="280" r:id="rId23"/>
-    <p:sldId id="275" r:id="rId24"/>
-    <p:sldId id="276" r:id="rId25"/>
-    <p:sldId id="277" r:id="rId26"/>
-    <p:sldId id="281" r:id="rId27"/>
-    <p:sldId id="282" r:id="rId28"/>
-    <p:sldId id="283" r:id="rId29"/>
-    <p:sldId id="284" r:id="rId30"/>
-    <p:sldId id="285" r:id="rId31"/>
-    <p:sldId id="286" r:id="rId32"/>
-    <p:sldId id="287" r:id="rId33"/>
+    <p:sldId id="288" r:id="rId3"/>
+    <p:sldId id="278" r:id="rId4"/>
+    <p:sldId id="257" r:id="rId5"/>
+    <p:sldId id="258" r:id="rId6"/>
+    <p:sldId id="259" r:id="rId7"/>
+    <p:sldId id="260" r:id="rId8"/>
+    <p:sldId id="261" r:id="rId9"/>
+    <p:sldId id="279" r:id="rId10"/>
+    <p:sldId id="262" r:id="rId11"/>
+    <p:sldId id="263" r:id="rId12"/>
+    <p:sldId id="264" r:id="rId13"/>
+    <p:sldId id="265" r:id="rId14"/>
+    <p:sldId id="266" r:id="rId15"/>
+    <p:sldId id="267" r:id="rId16"/>
+    <p:sldId id="269" r:id="rId17"/>
+    <p:sldId id="268" r:id="rId18"/>
+    <p:sldId id="270" r:id="rId19"/>
+    <p:sldId id="271" r:id="rId20"/>
+    <p:sldId id="272" r:id="rId21"/>
+    <p:sldId id="273" r:id="rId22"/>
+    <p:sldId id="274" r:id="rId23"/>
+    <p:sldId id="280" r:id="rId24"/>
+    <p:sldId id="275" r:id="rId25"/>
+    <p:sldId id="276" r:id="rId26"/>
+    <p:sldId id="277" r:id="rId27"/>
+    <p:sldId id="281" r:id="rId28"/>
+    <p:sldId id="282" r:id="rId29"/>
+    <p:sldId id="283" r:id="rId30"/>
+    <p:sldId id="284" r:id="rId31"/>
+    <p:sldId id="285" r:id="rId32"/>
+    <p:sldId id="286" r:id="rId33"/>
+    <p:sldId id="287" r:id="rId34"/>
   </p:sldIdLst>
   <p:sldSz cx="12192000" cy="6858000"/>
   <p:notesSz cx="6858000" cy="9144000"/>
@@ -138,6 +139,11 @@
       </a:defRPr>
     </a:lvl9pPr>
   </p:defaultTextStyle>
+  <p:extLst>
+    <p:ext uri="{EFAFB233-063F-42B5-8137-9DF3F51BA10A}">
+      <p15:sldGuideLst xmlns:p15="http://schemas.microsoft.com/office/powerpoint/2012/main"/>
+    </p:ext>
+  </p:extLst>
 </p:presentation>
 </file>
 
@@ -223,7 +229,7 @@
           <a:p>
             <a:fld id="{B9D115DF-F8A8-4A29-83C9-AA018FE5093D}" type="datetimeFigureOut">
               <a:rPr lang="en-CA" smtClean="0"/>
-              <a:t>2018-10-13</a:t>
+              <a:t>2018-10-27</a:t>
             </a:fld>
             <a:endParaRPr lang="en-CA"/>
           </a:p>
@@ -535,20 +541,6 @@
           <a:bodyPr/>
           <a:lstStyle/>
           <a:p>
-            <a:r>
-              <a:rPr lang="en-US" sz="1200" b="0" i="0" kern="1200" dirty="0">
-                <a:solidFill>
-                  <a:schemeClr val="tx1"/>
-                </a:solidFill>
-                <a:effectLst/>
-                <a:latin typeface="+mn-lt"/>
-                <a:ea typeface="+mn-ea"/>
-                <a:cs typeface="+mn-cs"/>
-              </a:rPr>
-              <a:t>Amazon EC2 uses public-key cryptography to encrypt and decrypt login information. Public-key cryptography uses a public key to encrypt a piece of data, such as a password, then the recipient uses the private key to decrypt the data. The public key and private keys are known as a key pair</a:t>
-            </a:r>
-          </a:p>
-          <a:p>
             <a:endParaRPr lang="en-CA" dirty="0"/>
           </a:p>
         </p:txBody>
@@ -570,7 +562,7 @@
           <a:p>
             <a:fld id="{5A873031-5E84-4CB0-BF16-B693B542090B}" type="slidenum">
               <a:rPr lang="en-CA" smtClean="0"/>
-              <a:t>3</a:t>
+              <a:t>2</a:t>
             </a:fld>
             <a:endParaRPr lang="en-CA"/>
           </a:p>
@@ -579,7 +571,7 @@
     </p:spTree>
     <p:extLst>
       <p:ext uri="{BB962C8B-B14F-4D97-AF65-F5344CB8AC3E}">
-        <p14:creationId xmlns:p14="http://schemas.microsoft.com/office/powerpoint/2010/main" val="2232024439"/>
+        <p14:creationId xmlns:p14="http://schemas.microsoft.com/office/powerpoint/2010/main" val="2635574897"/>
       </p:ext>
     </p:extLst>
   </p:cSld>
@@ -633,6 +625,20 @@
           <a:bodyPr/>
           <a:lstStyle/>
           <a:p>
+            <a:r>
+              <a:rPr lang="en-US" sz="1200" b="0" i="0" kern="1200" dirty="0">
+                <a:solidFill>
+                  <a:schemeClr val="tx1"/>
+                </a:solidFill>
+                <a:effectLst/>
+                <a:latin typeface="+mn-lt"/>
+                <a:ea typeface="+mn-ea"/>
+                <a:cs typeface="+mn-cs"/>
+              </a:rPr>
+              <a:t>Amazon EC2 uses public-key cryptography to encrypt and decrypt login information. Public-key cryptography uses a public key to encrypt a piece of data, such as a password, then the recipient uses the private key to decrypt the data. The public key and private keys are known as a key pair</a:t>
+            </a:r>
+          </a:p>
+          <a:p>
             <a:endParaRPr lang="en-CA" dirty="0"/>
           </a:p>
         </p:txBody>
@@ -654,7 +660,91 @@
           <a:p>
             <a:fld id="{5A873031-5E84-4CB0-BF16-B693B542090B}" type="slidenum">
               <a:rPr lang="en-CA" smtClean="0"/>
-              <a:t>7</a:t>
+              <a:t>4</a:t>
+            </a:fld>
+            <a:endParaRPr lang="en-CA"/>
+          </a:p>
+        </p:txBody>
+      </p:sp>
+    </p:spTree>
+    <p:extLst>
+      <p:ext uri="{BB962C8B-B14F-4D97-AF65-F5344CB8AC3E}">
+        <p14:creationId xmlns:p14="http://schemas.microsoft.com/office/powerpoint/2010/main" val="2232024439"/>
+      </p:ext>
+    </p:extLst>
+  </p:cSld>
+  <p:clrMapOvr>
+    <a:masterClrMapping/>
+  </p:clrMapOvr>
+</p:notes>
+</file>
+
+<file path=ppt/notesSlides/notesSlide3.xml><?xml version="1.0" encoding="utf-8"?>
+<p:notes xmlns:a="http://schemas.openxmlformats.org/drawingml/2006/main" xmlns:r="http://schemas.openxmlformats.org/officeDocument/2006/relationships" xmlns:p="http://schemas.openxmlformats.org/presentationml/2006/main">
+  <p:cSld>
+    <p:spTree>
+      <p:nvGrpSpPr>
+        <p:cNvPr id="1" name=""/>
+        <p:cNvGrpSpPr/>
+        <p:nvPr/>
+      </p:nvGrpSpPr>
+      <p:grpSpPr>
+        <a:xfrm>
+          <a:off x="0" y="0"/>
+          <a:ext cx="0" cy="0"/>
+          <a:chOff x="0" y="0"/>
+          <a:chExt cx="0" cy="0"/>
+        </a:xfrm>
+      </p:grpSpPr>
+      <p:sp>
+        <p:nvSpPr>
+          <p:cNvPr id="2" name="Slide Image Placeholder 1"/>
+          <p:cNvSpPr>
+            <a:spLocks noGrp="1" noRot="1" noChangeAspect="1"/>
+          </p:cNvSpPr>
+          <p:nvPr>
+            <p:ph type="sldImg"/>
+          </p:nvPr>
+        </p:nvSpPr>
+        <p:spPr/>
+      </p:sp>
+      <p:sp>
+        <p:nvSpPr>
+          <p:cNvPr id="3" name="Notes Placeholder 2"/>
+          <p:cNvSpPr>
+            <a:spLocks noGrp="1"/>
+          </p:cNvSpPr>
+          <p:nvPr>
+            <p:ph type="body" idx="1"/>
+          </p:nvPr>
+        </p:nvSpPr>
+        <p:spPr/>
+        <p:txBody>
+          <a:bodyPr/>
+          <a:lstStyle/>
+          <a:p>
+            <a:endParaRPr lang="en-CA" dirty="0"/>
+          </a:p>
+        </p:txBody>
+      </p:sp>
+      <p:sp>
+        <p:nvSpPr>
+          <p:cNvPr id="4" name="Slide Number Placeholder 3"/>
+          <p:cNvSpPr>
+            <a:spLocks noGrp="1"/>
+          </p:cNvSpPr>
+          <p:nvPr>
+            <p:ph type="sldNum" sz="quarter" idx="5"/>
+          </p:nvPr>
+        </p:nvSpPr>
+        <p:spPr/>
+        <p:txBody>
+          <a:bodyPr/>
+          <a:lstStyle/>
+          <a:p>
+            <a:fld id="{5A873031-5E84-4CB0-BF16-B693B542090B}" type="slidenum">
+              <a:rPr lang="en-CA" smtClean="0"/>
+              <a:t>8</a:t>
             </a:fld>
             <a:endParaRPr lang="en-CA"/>
           </a:p>
@@ -723,7 +813,7 @@
           <a:noFill/>
           <a:extLst>
             <a:ext uri="{909E8E84-426E-40dd-AFC4-6F175D3DCCD1}">
-              <a14:hiddenFill xmlns:a14="http://schemas.microsoft.com/office/drawing/2010/main" xmlns="">
+              <a14:hiddenFill xmlns="" xmlns:a14="http://schemas.microsoft.com/office/drawing/2010/main">
                 <a:solidFill>
                   <a:srgbClr val="FFFFFF"/>
                 </a:solidFill>
@@ -783,7 +873,7 @@
             </a:ln>
             <a:extLst>
               <a:ext uri="{91240B29-F687-4f45-9708-019B960494DF}">
-                <a14:hiddenLine xmlns:a14="http://schemas.microsoft.com/office/drawing/2010/main" xmlns="" w="9525">
+                <a14:hiddenLine xmlns="" xmlns:a14="http://schemas.microsoft.com/office/drawing/2010/main" w="9525">
                   <a:solidFill>
                     <a:srgbClr val="000000"/>
                   </a:solidFill>
@@ -873,7 +963,7 @@
             </a:ln>
             <a:extLst>
               <a:ext uri="{91240B29-F687-4f45-9708-019B960494DF}">
-                <a14:hiddenLine xmlns:a14="http://schemas.microsoft.com/office/drawing/2010/main" xmlns="" w="9525">
+                <a14:hiddenLine xmlns="" xmlns:a14="http://schemas.microsoft.com/office/drawing/2010/main" w="9525">
                   <a:solidFill>
                     <a:srgbClr val="000000"/>
                   </a:solidFill>
@@ -963,7 +1053,7 @@
             </a:ln>
             <a:extLst>
               <a:ext uri="{91240B29-F687-4f45-9708-019B960494DF}">
-                <a14:hiddenLine xmlns:a14="http://schemas.microsoft.com/office/drawing/2010/main" xmlns="" w="9525">
+                <a14:hiddenLine xmlns="" xmlns:a14="http://schemas.microsoft.com/office/drawing/2010/main" w="9525">
                   <a:solidFill>
                     <a:srgbClr val="000000"/>
                   </a:solidFill>
@@ -997,7 +1087,7 @@
             </a:ln>
             <a:extLst>
               <a:ext uri="{91240B29-F687-4f45-9708-019B960494DF}">
-                <a14:hiddenLine xmlns:a14="http://schemas.microsoft.com/office/drawing/2010/main" xmlns="" w="9525">
+                <a14:hiddenLine xmlns="" xmlns:a14="http://schemas.microsoft.com/office/drawing/2010/main" w="9525">
                   <a:solidFill>
                     <a:srgbClr val="000000"/>
                   </a:solidFill>
@@ -1087,7 +1177,7 @@
             </a:ln>
             <a:extLst>
               <a:ext uri="{91240B29-F687-4f45-9708-019B960494DF}">
-                <a14:hiddenLine xmlns:a14="http://schemas.microsoft.com/office/drawing/2010/main" xmlns="" w="9525">
+                <a14:hiddenLine xmlns="" xmlns:a14="http://schemas.microsoft.com/office/drawing/2010/main" w="9525">
                   <a:solidFill>
                     <a:srgbClr val="000000"/>
                   </a:solidFill>
@@ -1149,7 +1239,7 @@
             </a:ln>
             <a:extLst>
               <a:ext uri="{91240B29-F687-4f45-9708-019B960494DF}">
-                <a14:hiddenLine xmlns:a14="http://schemas.microsoft.com/office/drawing/2010/main" xmlns="" w="9525">
+                <a14:hiddenLine xmlns="" xmlns:a14="http://schemas.microsoft.com/office/drawing/2010/main" w="9525">
                   <a:solidFill>
                     <a:srgbClr val="000000"/>
                   </a:solidFill>
@@ -1211,7 +1301,7 @@
             </a:ln>
             <a:extLst>
               <a:ext uri="{91240B29-F687-4f45-9708-019B960494DF}">
-                <a14:hiddenLine xmlns:a14="http://schemas.microsoft.com/office/drawing/2010/main" xmlns="" w="9525">
+                <a14:hiddenLine xmlns="" xmlns:a14="http://schemas.microsoft.com/office/drawing/2010/main" w="9525">
                   <a:solidFill>
                     <a:srgbClr val="000000"/>
                   </a:solidFill>
@@ -1301,7 +1391,7 @@
             </a:ln>
             <a:extLst>
               <a:ext uri="{91240B29-F687-4f45-9708-019B960494DF}">
-                <a14:hiddenLine xmlns:a14="http://schemas.microsoft.com/office/drawing/2010/main" xmlns="" w="9525">
+                <a14:hiddenLine xmlns="" xmlns:a14="http://schemas.microsoft.com/office/drawing/2010/main" w="9525">
                   <a:solidFill>
                     <a:srgbClr val="000000"/>
                   </a:solidFill>
@@ -1363,7 +1453,7 @@
             </a:ln>
             <a:extLst>
               <a:ext uri="{91240B29-F687-4f45-9708-019B960494DF}">
-                <a14:hiddenLine xmlns:a14="http://schemas.microsoft.com/office/drawing/2010/main" xmlns="" w="9525">
+                <a14:hiddenLine xmlns="" xmlns:a14="http://schemas.microsoft.com/office/drawing/2010/main" w="9525">
                   <a:solidFill>
                     <a:srgbClr val="000000"/>
                   </a:solidFill>
@@ -1425,7 +1515,7 @@
             </a:ln>
             <a:extLst>
               <a:ext uri="{91240B29-F687-4f45-9708-019B960494DF}">
-                <a14:hiddenLine xmlns:a14="http://schemas.microsoft.com/office/drawing/2010/main" xmlns="" w="9525">
+                <a14:hiddenLine xmlns="" xmlns:a14="http://schemas.microsoft.com/office/drawing/2010/main" w="9525">
                   <a:solidFill>
                     <a:srgbClr val="000000"/>
                   </a:solidFill>
@@ -1515,7 +1605,7 @@
             </a:ln>
             <a:extLst>
               <a:ext uri="{91240B29-F687-4f45-9708-019B960494DF}">
-                <a14:hiddenLine xmlns:a14="http://schemas.microsoft.com/office/drawing/2010/main" xmlns="" w="9525">
+                <a14:hiddenLine xmlns="" xmlns:a14="http://schemas.microsoft.com/office/drawing/2010/main" w="9525">
                   <a:solidFill>
                     <a:srgbClr val="000000"/>
                   </a:solidFill>
@@ -1605,7 +1695,7 @@
             </a:ln>
             <a:extLst>
               <a:ext uri="{91240B29-F687-4f45-9708-019B960494DF}">
-                <a14:hiddenLine xmlns:a14="http://schemas.microsoft.com/office/drawing/2010/main" xmlns="" w="9525">
+                <a14:hiddenLine xmlns="" xmlns:a14="http://schemas.microsoft.com/office/drawing/2010/main" w="9525">
                   <a:solidFill>
                     <a:srgbClr val="000000"/>
                   </a:solidFill>
@@ -1667,7 +1757,7 @@
             </a:ln>
             <a:extLst>
               <a:ext uri="{91240B29-F687-4f45-9708-019B960494DF}">
-                <a14:hiddenLine xmlns:a14="http://schemas.microsoft.com/office/drawing/2010/main" xmlns="" w="9525">
+                <a14:hiddenLine xmlns="" xmlns:a14="http://schemas.microsoft.com/office/drawing/2010/main" w="9525">
                   <a:solidFill>
                     <a:srgbClr val="000000"/>
                   </a:solidFill>
@@ -1777,7 +1867,7 @@
             </a:ln>
             <a:extLst>
               <a:ext uri="{91240B29-F687-4f45-9708-019B960494DF}">
-                <a14:hiddenLine xmlns:a14="http://schemas.microsoft.com/office/drawing/2010/main" xmlns="" w="9525">
+                <a14:hiddenLine xmlns="" xmlns:a14="http://schemas.microsoft.com/office/drawing/2010/main" w="9525">
                   <a:solidFill>
                     <a:srgbClr val="000000"/>
                   </a:solidFill>
@@ -1839,7 +1929,7 @@
             </a:ln>
             <a:extLst>
               <a:ext uri="{91240B29-F687-4f45-9708-019B960494DF}">
-                <a14:hiddenLine xmlns:a14="http://schemas.microsoft.com/office/drawing/2010/main" xmlns="" w="9525">
+                <a14:hiddenLine xmlns="" xmlns:a14="http://schemas.microsoft.com/office/drawing/2010/main" w="9525">
                   <a:solidFill>
                     <a:srgbClr val="000000"/>
                   </a:solidFill>
@@ -1929,7 +2019,7 @@
             </a:ln>
             <a:extLst>
               <a:ext uri="{91240B29-F687-4f45-9708-019B960494DF}">
-                <a14:hiddenLine xmlns:a14="http://schemas.microsoft.com/office/drawing/2010/main" xmlns="" w="9525">
+                <a14:hiddenLine xmlns="" xmlns:a14="http://schemas.microsoft.com/office/drawing/2010/main" w="9525">
                   <a:solidFill>
                     <a:srgbClr val="000000"/>
                   </a:solidFill>
@@ -2019,7 +2109,7 @@
             </a:ln>
             <a:extLst>
               <a:ext uri="{91240B29-F687-4f45-9708-019B960494DF}">
-                <a14:hiddenLine xmlns:a14="http://schemas.microsoft.com/office/drawing/2010/main" xmlns="" w="9525">
+                <a14:hiddenLine xmlns="" xmlns:a14="http://schemas.microsoft.com/office/drawing/2010/main" w="9525">
                   <a:solidFill>
                     <a:srgbClr val="000000"/>
                   </a:solidFill>
@@ -2081,7 +2171,7 @@
             </a:ln>
             <a:extLst>
               <a:ext uri="{91240B29-F687-4f45-9708-019B960494DF}">
-                <a14:hiddenLine xmlns:a14="http://schemas.microsoft.com/office/drawing/2010/main" xmlns="" w="9525">
+                <a14:hiddenLine xmlns="" xmlns:a14="http://schemas.microsoft.com/office/drawing/2010/main" w="9525">
                   <a:solidFill>
                     <a:srgbClr val="000000"/>
                   </a:solidFill>
@@ -2171,7 +2261,7 @@
             </a:ln>
             <a:extLst>
               <a:ext uri="{91240B29-F687-4f45-9708-019B960494DF}">
-                <a14:hiddenLine xmlns:a14="http://schemas.microsoft.com/office/drawing/2010/main" xmlns="" w="9525">
+                <a14:hiddenLine xmlns="" xmlns:a14="http://schemas.microsoft.com/office/drawing/2010/main" w="9525">
                   <a:solidFill>
                     <a:srgbClr val="000000"/>
                   </a:solidFill>
@@ -2261,7 +2351,7 @@
             </a:ln>
             <a:extLst>
               <a:ext uri="{91240B29-F687-4f45-9708-019B960494DF}">
-                <a14:hiddenLine xmlns:a14="http://schemas.microsoft.com/office/drawing/2010/main" xmlns="" w="9525">
+                <a14:hiddenLine xmlns="" xmlns:a14="http://schemas.microsoft.com/office/drawing/2010/main" w="9525">
                   <a:solidFill>
                     <a:srgbClr val="000000"/>
                   </a:solidFill>
@@ -2317,7 +2407,7 @@
             </a:ln>
             <a:extLst>
               <a:ext uri="{91240B29-F687-4f45-9708-019B960494DF}">
-                <a14:hiddenLine xmlns:a14="http://schemas.microsoft.com/office/drawing/2010/main" xmlns="" w="9525">
+                <a14:hiddenLine xmlns="" xmlns:a14="http://schemas.microsoft.com/office/drawing/2010/main" w="9525">
                   <a:solidFill>
                     <a:srgbClr val="000000"/>
                   </a:solidFill>
@@ -2407,7 +2497,7 @@
             </a:ln>
             <a:extLst>
               <a:ext uri="{91240B29-F687-4f45-9708-019B960494DF}">
-                <a14:hiddenLine xmlns:a14="http://schemas.microsoft.com/office/drawing/2010/main" xmlns="" w="9525">
+                <a14:hiddenLine xmlns="" xmlns:a14="http://schemas.microsoft.com/office/drawing/2010/main" w="9525">
                   <a:solidFill>
                     <a:srgbClr val="000000"/>
                   </a:solidFill>
@@ -2463,7 +2553,7 @@
             </a:ln>
             <a:extLst>
               <a:ext uri="{91240B29-F687-4f45-9708-019B960494DF}">
-                <a14:hiddenLine xmlns:a14="http://schemas.microsoft.com/office/drawing/2010/main" xmlns="" w="9525">
+                <a14:hiddenLine xmlns="" xmlns:a14="http://schemas.microsoft.com/office/drawing/2010/main" w="9525">
                   <a:solidFill>
                     <a:srgbClr val="000000"/>
                   </a:solidFill>
@@ -2553,7 +2643,7 @@
             </a:ln>
             <a:extLst>
               <a:ext uri="{91240B29-F687-4f45-9708-019B960494DF}">
-                <a14:hiddenLine xmlns:a14="http://schemas.microsoft.com/office/drawing/2010/main" xmlns="" w="9525">
+                <a14:hiddenLine xmlns="" xmlns:a14="http://schemas.microsoft.com/office/drawing/2010/main" w="9525">
                   <a:solidFill>
                     <a:srgbClr val="000000"/>
                   </a:solidFill>
@@ -2621,7 +2711,7 @@
             </a:ln>
             <a:extLst>
               <a:ext uri="{91240B29-F687-4f45-9708-019B960494DF}">
-                <a14:hiddenLine xmlns:a14="http://schemas.microsoft.com/office/drawing/2010/main" xmlns="" w="9525">
+                <a14:hiddenLine xmlns="" xmlns:a14="http://schemas.microsoft.com/office/drawing/2010/main" w="9525">
                   <a:solidFill>
                     <a:srgbClr val="000000"/>
                   </a:solidFill>
@@ -2711,7 +2801,7 @@
             </a:ln>
             <a:extLst>
               <a:ext uri="{91240B29-F687-4f45-9708-019B960494DF}">
-                <a14:hiddenLine xmlns:a14="http://schemas.microsoft.com/office/drawing/2010/main" xmlns="" w="9525">
+                <a14:hiddenLine xmlns="" xmlns:a14="http://schemas.microsoft.com/office/drawing/2010/main" w="9525">
                   <a:solidFill>
                     <a:srgbClr val="000000"/>
                   </a:solidFill>
@@ -2779,7 +2869,7 @@
             </a:ln>
             <a:extLst>
               <a:ext uri="{91240B29-F687-4f45-9708-019B960494DF}">
-                <a14:hiddenLine xmlns:a14="http://schemas.microsoft.com/office/drawing/2010/main" xmlns="" w="9525">
+                <a14:hiddenLine xmlns="" xmlns:a14="http://schemas.microsoft.com/office/drawing/2010/main" w="9525">
                   <a:solidFill>
                     <a:srgbClr val="000000"/>
                   </a:solidFill>
@@ -2869,7 +2959,7 @@
             </a:ln>
             <a:extLst>
               <a:ext uri="{91240B29-F687-4f45-9708-019B960494DF}">
-                <a14:hiddenLine xmlns:a14="http://schemas.microsoft.com/office/drawing/2010/main" xmlns="" w="9525">
+                <a14:hiddenLine xmlns="" xmlns:a14="http://schemas.microsoft.com/office/drawing/2010/main" w="9525">
                   <a:solidFill>
                     <a:srgbClr val="000000"/>
                   </a:solidFill>
@@ -2903,7 +2993,7 @@
             </a:ln>
             <a:extLst>
               <a:ext uri="{91240B29-F687-4f45-9708-019B960494DF}">
-                <a14:hiddenLine xmlns:a14="http://schemas.microsoft.com/office/drawing/2010/main" xmlns="" w="9525">
+                <a14:hiddenLine xmlns="" xmlns:a14="http://schemas.microsoft.com/office/drawing/2010/main" w="9525">
                   <a:solidFill>
                     <a:srgbClr val="000000"/>
                   </a:solidFill>
@@ -2993,7 +3083,7 @@
             </a:ln>
             <a:extLst>
               <a:ext uri="{91240B29-F687-4f45-9708-019B960494DF}">
-                <a14:hiddenLine xmlns:a14="http://schemas.microsoft.com/office/drawing/2010/main" xmlns="" w="9525">
+                <a14:hiddenLine xmlns="" xmlns:a14="http://schemas.microsoft.com/office/drawing/2010/main" w="9525">
                   <a:solidFill>
                     <a:srgbClr val="000000"/>
                   </a:solidFill>
@@ -3055,7 +3145,7 @@
             </a:ln>
             <a:extLst>
               <a:ext uri="{91240B29-F687-4f45-9708-019B960494DF}">
-                <a14:hiddenLine xmlns:a14="http://schemas.microsoft.com/office/drawing/2010/main" xmlns="" w="9525">
+                <a14:hiddenLine xmlns="" xmlns:a14="http://schemas.microsoft.com/office/drawing/2010/main" w="9525">
                   <a:solidFill>
                     <a:srgbClr val="000000"/>
                   </a:solidFill>
@@ -3117,7 +3207,7 @@
             </a:ln>
             <a:extLst>
               <a:ext uri="{91240B29-F687-4f45-9708-019B960494DF}">
-                <a14:hiddenLine xmlns:a14="http://schemas.microsoft.com/office/drawing/2010/main" xmlns="" w="9525">
+                <a14:hiddenLine xmlns="" xmlns:a14="http://schemas.microsoft.com/office/drawing/2010/main" w="9525">
                   <a:solidFill>
                     <a:srgbClr val="000000"/>
                   </a:solidFill>
@@ -3207,7 +3297,7 @@
             </a:ln>
             <a:extLst>
               <a:ext uri="{91240B29-F687-4f45-9708-019B960494DF}">
-                <a14:hiddenLine xmlns:a14="http://schemas.microsoft.com/office/drawing/2010/main" xmlns="" w="9525">
+                <a14:hiddenLine xmlns="" xmlns:a14="http://schemas.microsoft.com/office/drawing/2010/main" w="9525">
                   <a:solidFill>
                     <a:srgbClr val="000000"/>
                   </a:solidFill>
@@ -3275,7 +3365,7 @@
             </a:ln>
             <a:extLst>
               <a:ext uri="{91240B29-F687-4f45-9708-019B960494DF}">
-                <a14:hiddenLine xmlns:a14="http://schemas.microsoft.com/office/drawing/2010/main" xmlns="" w="9525">
+                <a14:hiddenLine xmlns="" xmlns:a14="http://schemas.microsoft.com/office/drawing/2010/main" w="9525">
                   <a:solidFill>
                     <a:srgbClr val="000000"/>
                   </a:solidFill>
@@ -3337,7 +3427,7 @@
             </a:ln>
             <a:extLst>
               <a:ext uri="{91240B29-F687-4f45-9708-019B960494DF}">
-                <a14:hiddenLine xmlns:a14="http://schemas.microsoft.com/office/drawing/2010/main" xmlns="" w="9525">
+                <a14:hiddenLine xmlns="" xmlns:a14="http://schemas.microsoft.com/office/drawing/2010/main" w="9525">
                   <a:solidFill>
                     <a:srgbClr val="000000"/>
                   </a:solidFill>
@@ -3427,7 +3517,7 @@
             </a:ln>
             <a:extLst>
               <a:ext uri="{91240B29-F687-4f45-9708-019B960494DF}">
-                <a14:hiddenLine xmlns:a14="http://schemas.microsoft.com/office/drawing/2010/main" xmlns="" w="9525">
+                <a14:hiddenLine xmlns="" xmlns:a14="http://schemas.microsoft.com/office/drawing/2010/main" w="9525">
                   <a:solidFill>
                     <a:srgbClr val="000000"/>
                   </a:solidFill>
@@ -3489,7 +3579,7 @@
             </a:ln>
             <a:extLst>
               <a:ext uri="{91240B29-F687-4f45-9708-019B960494DF}">
-                <a14:hiddenLine xmlns:a14="http://schemas.microsoft.com/office/drawing/2010/main" xmlns="" w="9525">
+                <a14:hiddenLine xmlns="" xmlns:a14="http://schemas.microsoft.com/office/drawing/2010/main" w="9525">
                   <a:solidFill>
                     <a:srgbClr val="000000"/>
                   </a:solidFill>
@@ -3579,7 +3669,7 @@
             </a:ln>
             <a:extLst>
               <a:ext uri="{91240B29-F687-4f45-9708-019B960494DF}">
-                <a14:hiddenLine xmlns:a14="http://schemas.microsoft.com/office/drawing/2010/main" xmlns="" w="9525">
+                <a14:hiddenLine xmlns="" xmlns:a14="http://schemas.microsoft.com/office/drawing/2010/main" w="9525">
                   <a:solidFill>
                     <a:srgbClr val="000000"/>
                   </a:solidFill>
@@ -3641,7 +3731,7 @@
             </a:ln>
             <a:extLst>
               <a:ext uri="{91240B29-F687-4f45-9708-019B960494DF}">
-                <a14:hiddenLine xmlns:a14="http://schemas.microsoft.com/office/drawing/2010/main" xmlns="" w="9525">
+                <a14:hiddenLine xmlns="" xmlns:a14="http://schemas.microsoft.com/office/drawing/2010/main" w="9525">
                   <a:solidFill>
                     <a:srgbClr val="000000"/>
                   </a:solidFill>
@@ -3731,7 +3821,7 @@
             </a:ln>
             <a:extLst>
               <a:ext uri="{91240B29-F687-4f45-9708-019B960494DF}">
-                <a14:hiddenLine xmlns:a14="http://schemas.microsoft.com/office/drawing/2010/main" xmlns="" w="9525">
+                <a14:hiddenLine xmlns="" xmlns:a14="http://schemas.microsoft.com/office/drawing/2010/main" w="9525">
                   <a:solidFill>
                     <a:srgbClr val="000000"/>
                   </a:solidFill>
@@ -3765,7 +3855,7 @@
             </a:ln>
             <a:extLst>
               <a:ext uri="{91240B29-F687-4f45-9708-019B960494DF}">
-                <a14:hiddenLine xmlns:a14="http://schemas.microsoft.com/office/drawing/2010/main" xmlns="" w="9525">
+                <a14:hiddenLine xmlns="" xmlns:a14="http://schemas.microsoft.com/office/drawing/2010/main" w="9525">
                   <a:solidFill>
                     <a:srgbClr val="000000"/>
                   </a:solidFill>
@@ -3830,7 +3920,7 @@
             </a:ln>
             <a:extLst>
               <a:ext uri="{91240B29-F687-4f45-9708-019B960494DF}">
-                <a14:hiddenLine xmlns:a14="http://schemas.microsoft.com/office/drawing/2010/main" xmlns="" w="9525">
+                <a14:hiddenLine xmlns="" xmlns:a14="http://schemas.microsoft.com/office/drawing/2010/main" w="9525">
                   <a:solidFill>
                     <a:srgbClr val="000000"/>
                   </a:solidFill>
@@ -3920,7 +4010,7 @@
             </a:ln>
             <a:extLst>
               <a:ext uri="{91240B29-F687-4f45-9708-019B960494DF}">
-                <a14:hiddenLine xmlns:a14="http://schemas.microsoft.com/office/drawing/2010/main" xmlns="" w="9525">
+                <a14:hiddenLine xmlns="" xmlns:a14="http://schemas.microsoft.com/office/drawing/2010/main" w="9525">
                   <a:solidFill>
                     <a:srgbClr val="000000"/>
                   </a:solidFill>
@@ -3982,7 +4072,7 @@
             </a:ln>
             <a:extLst>
               <a:ext uri="{91240B29-F687-4f45-9708-019B960494DF}">
-                <a14:hiddenLine xmlns:a14="http://schemas.microsoft.com/office/drawing/2010/main" xmlns="" w="9525">
+                <a14:hiddenLine xmlns="" xmlns:a14="http://schemas.microsoft.com/office/drawing/2010/main" w="9525">
                   <a:solidFill>
                     <a:srgbClr val="000000"/>
                   </a:solidFill>
@@ -4072,7 +4162,7 @@
             </a:ln>
             <a:extLst>
               <a:ext uri="{91240B29-F687-4f45-9708-019B960494DF}">
-                <a14:hiddenLine xmlns:a14="http://schemas.microsoft.com/office/drawing/2010/main" xmlns="" w="9525">
+                <a14:hiddenLine xmlns="" xmlns:a14="http://schemas.microsoft.com/office/drawing/2010/main" w="9525">
                   <a:solidFill>
                     <a:srgbClr val="000000"/>
                   </a:solidFill>
@@ -4162,7 +4252,7 @@
             </a:ln>
             <a:extLst>
               <a:ext uri="{91240B29-F687-4f45-9708-019B960494DF}">
-                <a14:hiddenLine xmlns:a14="http://schemas.microsoft.com/office/drawing/2010/main" xmlns="" w="9525">
+                <a14:hiddenLine xmlns="" xmlns:a14="http://schemas.microsoft.com/office/drawing/2010/main" w="9525">
                   <a:solidFill>
                     <a:srgbClr val="000000"/>
                   </a:solidFill>
@@ -4227,7 +4317,7 @@
             </a:ln>
             <a:extLst>
               <a:ext uri="{91240B29-F687-4f45-9708-019B960494DF}">
-                <a14:hiddenLine xmlns:a14="http://schemas.microsoft.com/office/drawing/2010/main" xmlns="" w="9525">
+                <a14:hiddenLine xmlns="" xmlns:a14="http://schemas.microsoft.com/office/drawing/2010/main" w="9525">
                   <a:solidFill>
                     <a:srgbClr val="000000"/>
                   </a:solidFill>
@@ -4289,7 +4379,7 @@
             </a:ln>
             <a:extLst>
               <a:ext uri="{91240B29-F687-4f45-9708-019B960494DF}">
-                <a14:hiddenLine xmlns:a14="http://schemas.microsoft.com/office/drawing/2010/main" xmlns="" w="9525">
+                <a14:hiddenLine xmlns="" xmlns:a14="http://schemas.microsoft.com/office/drawing/2010/main" w="9525">
                   <a:solidFill>
                     <a:srgbClr val="000000"/>
                   </a:solidFill>
@@ -4379,7 +4469,7 @@
             </a:ln>
             <a:extLst>
               <a:ext uri="{91240B29-F687-4f45-9708-019B960494DF}">
-                <a14:hiddenLine xmlns:a14="http://schemas.microsoft.com/office/drawing/2010/main" xmlns="" w="9525">
+                <a14:hiddenLine xmlns="" xmlns:a14="http://schemas.microsoft.com/office/drawing/2010/main" w="9525">
                   <a:solidFill>
                     <a:srgbClr val="000000"/>
                   </a:solidFill>
@@ -4469,7 +4559,7 @@
             </a:ln>
             <a:extLst>
               <a:ext uri="{91240B29-F687-4f45-9708-019B960494DF}">
-                <a14:hiddenLine xmlns:a14="http://schemas.microsoft.com/office/drawing/2010/main" xmlns="" w="9525">
+                <a14:hiddenLine xmlns="" xmlns:a14="http://schemas.microsoft.com/office/drawing/2010/main" w="9525">
                   <a:solidFill>
                     <a:srgbClr val="000000"/>
                   </a:solidFill>
@@ -4531,7 +4621,7 @@
             </a:ln>
             <a:extLst>
               <a:ext uri="{91240B29-F687-4f45-9708-019B960494DF}">
-                <a14:hiddenLine xmlns:a14="http://schemas.microsoft.com/office/drawing/2010/main" xmlns="" w="9525">
+                <a14:hiddenLine xmlns="" xmlns:a14="http://schemas.microsoft.com/office/drawing/2010/main" w="9525">
                   <a:solidFill>
                     <a:srgbClr val="000000"/>
                   </a:solidFill>
@@ -4651,7 +4741,7 @@
             </a:ln>
             <a:extLst>
               <a:ext uri="{91240B29-F687-4f45-9708-019B960494DF}">
-                <a14:hiddenLine xmlns:a14="http://schemas.microsoft.com/office/drawing/2010/main" xmlns="" w="9525">
+                <a14:hiddenLine xmlns="" xmlns:a14="http://schemas.microsoft.com/office/drawing/2010/main" w="9525">
                   <a:solidFill>
                     <a:srgbClr val="000000"/>
                   </a:solidFill>
@@ -4719,7 +4809,7 @@
             </a:ln>
             <a:extLst>
               <a:ext uri="{91240B29-F687-4f45-9708-019B960494DF}">
-                <a14:hiddenLine xmlns:a14="http://schemas.microsoft.com/office/drawing/2010/main" xmlns="" w="9525">
+                <a14:hiddenLine xmlns="" xmlns:a14="http://schemas.microsoft.com/office/drawing/2010/main" w="9525">
                   <a:solidFill>
                     <a:srgbClr val="000000"/>
                   </a:solidFill>
@@ -4809,7 +4899,7 @@
             </a:ln>
             <a:extLst>
               <a:ext uri="{91240B29-F687-4f45-9708-019B960494DF}">
-                <a14:hiddenLine xmlns:a14="http://schemas.microsoft.com/office/drawing/2010/main" xmlns="" w="9525">
+                <a14:hiddenLine xmlns="" xmlns:a14="http://schemas.microsoft.com/office/drawing/2010/main" w="9525">
                   <a:solidFill>
                     <a:srgbClr val="000000"/>
                   </a:solidFill>
@@ -4949,7 +5039,7 @@
           <a:p>
             <a:fld id="{48A87A34-81AB-432B-8DAE-1953F412C126}" type="datetimeFigureOut">
               <a:rPr lang="en-US" dirty="0"/>
-              <a:t>10/13/2018</a:t>
+              <a:t>10/27/2018</a:t>
             </a:fld>
             <a:endParaRPr lang="en-US" dirty="0"/>
           </a:p>
@@ -5211,7 +5301,7 @@
           <a:p>
             <a:fld id="{48A87A34-81AB-432B-8DAE-1953F412C126}" type="datetimeFigureOut">
               <a:rPr lang="en-US" dirty="0"/>
-              <a:t>10/13/2018</a:t>
+              <a:t>10/27/2018</a:t>
             </a:fld>
             <a:endParaRPr lang="en-US" dirty="0"/>
           </a:p>
@@ -5402,7 +5492,7 @@
           <a:p>
             <a:fld id="{48A87A34-81AB-432B-8DAE-1953F412C126}" type="datetimeFigureOut">
               <a:rPr lang="en-US" dirty="0"/>
-              <a:t>10/13/2018</a:t>
+              <a:t>10/27/2018</a:t>
             </a:fld>
             <a:endParaRPr lang="en-US" dirty="0"/>
           </a:p>
@@ -5660,7 +5750,7 @@
           <a:p>
             <a:fld id="{48A87A34-81AB-432B-8DAE-1953F412C126}" type="datetimeFigureOut">
               <a:rPr lang="en-US" dirty="0"/>
-              <a:t>10/13/2018</a:t>
+              <a:t>10/27/2018</a:t>
             </a:fld>
             <a:endParaRPr lang="en-US" dirty="0"/>
           </a:p>
@@ -6089,7 +6179,7 @@
           <a:p>
             <a:fld id="{48A87A34-81AB-432B-8DAE-1953F412C126}" type="datetimeFigureOut">
               <a:rPr lang="en-US" dirty="0"/>
-              <a:t>10/13/2018</a:t>
+              <a:t>10/27/2018</a:t>
             </a:fld>
             <a:endParaRPr lang="en-US" dirty="0"/>
           </a:p>
@@ -6630,7 +6720,7 @@
           <a:p>
             <a:fld id="{48A87A34-81AB-432B-8DAE-1953F412C126}" type="datetimeFigureOut">
               <a:rPr lang="en-US" dirty="0"/>
-              <a:t>10/13/2018</a:t>
+              <a:t>10/27/2018</a:t>
             </a:fld>
             <a:endParaRPr lang="en-US" dirty="0"/>
           </a:p>
@@ -7345,7 +7435,7 @@
           <a:p>
             <a:fld id="{48A87A34-81AB-432B-8DAE-1953F412C126}" type="datetimeFigureOut">
               <a:rPr lang="en-US" dirty="0"/>
-              <a:t>10/13/2018</a:t>
+              <a:t>10/27/2018</a:t>
             </a:fld>
             <a:endParaRPr lang="en-US" dirty="0"/>
           </a:p>
@@ -7510,7 +7600,7 @@
           <a:p>
             <a:fld id="{48A87A34-81AB-432B-8DAE-1953F412C126}" type="datetimeFigureOut">
               <a:rPr lang="en-US" dirty="0"/>
-              <a:t>10/13/2018</a:t>
+              <a:t>10/27/2018</a:t>
             </a:fld>
             <a:endParaRPr lang="en-US" dirty="0"/>
           </a:p>
@@ -7685,7 +7775,7 @@
           <a:p>
             <a:fld id="{48A87A34-81AB-432B-8DAE-1953F412C126}" type="datetimeFigureOut">
               <a:rPr lang="en-US" dirty="0"/>
-              <a:t>10/13/2018</a:t>
+              <a:t>10/27/2018</a:t>
             </a:fld>
             <a:endParaRPr lang="en-US" dirty="0"/>
           </a:p>
@@ -7850,7 +7940,7 @@
           <a:p>
             <a:fld id="{48A87A34-81AB-432B-8DAE-1953F412C126}" type="datetimeFigureOut">
               <a:rPr lang="en-US" dirty="0"/>
-              <a:t>10/13/2018</a:t>
+              <a:t>10/27/2018</a:t>
             </a:fld>
             <a:endParaRPr lang="en-US" dirty="0"/>
           </a:p>
@@ -8095,7 +8185,7 @@
           <a:p>
             <a:fld id="{48A87A34-81AB-432B-8DAE-1953F412C126}" type="datetimeFigureOut">
               <a:rPr lang="en-US" dirty="0"/>
-              <a:t>10/13/2018</a:t>
+              <a:t>10/27/2018</a:t>
             </a:fld>
             <a:endParaRPr lang="en-US" dirty="0"/>
           </a:p>
@@ -8322,7 +8412,7 @@
           <a:p>
             <a:fld id="{48A87A34-81AB-432B-8DAE-1953F412C126}" type="datetimeFigureOut">
               <a:rPr lang="en-US" dirty="0"/>
-              <a:t>10/13/2018</a:t>
+              <a:t>10/27/2018</a:t>
             </a:fld>
             <a:endParaRPr lang="en-US" dirty="0"/>
           </a:p>
@@ -8698,7 +8788,7 @@
           <a:p>
             <a:fld id="{48A87A34-81AB-432B-8DAE-1953F412C126}" type="datetimeFigureOut">
               <a:rPr lang="en-US" dirty="0"/>
-              <a:t>10/13/2018</a:t>
+              <a:t>10/27/2018</a:t>
             </a:fld>
             <a:endParaRPr lang="en-US" dirty="0"/>
           </a:p>
@@ -8811,7 +8901,7 @@
           <a:p>
             <a:fld id="{48A87A34-81AB-432B-8DAE-1953F412C126}" type="datetimeFigureOut">
               <a:rPr lang="en-US" dirty="0"/>
-              <a:t>10/13/2018</a:t>
+              <a:t>10/27/2018</a:t>
             </a:fld>
             <a:endParaRPr lang="en-US" dirty="0"/>
           </a:p>
@@ -8901,7 +8991,7 @@
           <a:p>
             <a:fld id="{48A87A34-81AB-432B-8DAE-1953F412C126}" type="datetimeFigureOut">
               <a:rPr lang="en-US" dirty="0"/>
-              <a:t>10/13/2018</a:t>
+              <a:t>10/27/2018</a:t>
             </a:fld>
             <a:endParaRPr lang="en-US" dirty="0"/>
           </a:p>
@@ -9145,7 +9235,7 @@
           <a:p>
             <a:fld id="{48A87A34-81AB-432B-8DAE-1953F412C126}" type="datetimeFigureOut">
               <a:rPr lang="en-US" dirty="0"/>
-              <a:t>10/13/2018</a:t>
+              <a:t>10/27/2018</a:t>
             </a:fld>
             <a:endParaRPr lang="en-US" dirty="0"/>
           </a:p>
@@ -9420,7 +9510,7 @@
           <a:p>
             <a:fld id="{48A87A34-81AB-432B-8DAE-1953F412C126}" type="datetimeFigureOut">
               <a:rPr lang="en-US" dirty="0"/>
-              <a:t>10/13/2018</a:t>
+              <a:t>10/27/2018</a:t>
             </a:fld>
             <a:endParaRPr lang="en-US" dirty="0"/>
           </a:p>
@@ -9531,7 +9621,7 @@
           <a:noFill/>
           <a:extLst>
             <a:ext uri="{909E8E84-426E-40dd-AFC4-6F175D3DCCD1}">
-              <a14:hiddenFill xmlns:a14="http://schemas.microsoft.com/office/drawing/2010/main" xmlns="">
+              <a14:hiddenFill xmlns="" xmlns:a14="http://schemas.microsoft.com/office/drawing/2010/main">
                 <a:solidFill>
                   <a:srgbClr val="FFFFFF"/>
                 </a:solidFill>
@@ -9605,7 +9695,7 @@
               </a:ln>
               <a:extLst>
                 <a:ext uri="{91240B29-F687-4f45-9708-019B960494DF}">
-                  <a14:hiddenLine xmlns:a14="http://schemas.microsoft.com/office/drawing/2010/main" xmlns="" w="9525">
+                  <a14:hiddenLine xmlns="" xmlns:a14="http://schemas.microsoft.com/office/drawing/2010/main" w="9525">
                     <a:solidFill>
                       <a:srgbClr val="000000"/>
                     </a:solidFill>
@@ -9695,7 +9785,7 @@
               </a:ln>
               <a:extLst>
                 <a:ext uri="{91240B29-F687-4f45-9708-019B960494DF}">
-                  <a14:hiddenLine xmlns:a14="http://schemas.microsoft.com/office/drawing/2010/main" xmlns="" w="9525">
+                  <a14:hiddenLine xmlns="" xmlns:a14="http://schemas.microsoft.com/office/drawing/2010/main" w="9525">
                     <a:solidFill>
                       <a:srgbClr val="000000"/>
                     </a:solidFill>
@@ -9785,7 +9875,7 @@
               </a:ln>
               <a:extLst>
                 <a:ext uri="{91240B29-F687-4f45-9708-019B960494DF}">
-                  <a14:hiddenLine xmlns:a14="http://schemas.microsoft.com/office/drawing/2010/main" xmlns="" w="9525">
+                  <a14:hiddenLine xmlns="" xmlns:a14="http://schemas.microsoft.com/office/drawing/2010/main" w="9525">
                     <a:solidFill>
                       <a:srgbClr val="000000"/>
                     </a:solidFill>
@@ -9847,7 +9937,7 @@
               </a:ln>
               <a:extLst>
                 <a:ext uri="{91240B29-F687-4f45-9708-019B960494DF}">
-                  <a14:hiddenLine xmlns:a14="http://schemas.microsoft.com/office/drawing/2010/main" xmlns="" w="9525">
+                  <a14:hiddenLine xmlns="" xmlns:a14="http://schemas.microsoft.com/office/drawing/2010/main" w="9525">
                     <a:solidFill>
                       <a:srgbClr val="000000"/>
                     </a:solidFill>
@@ -9937,7 +10027,7 @@
               </a:ln>
               <a:extLst>
                 <a:ext uri="{91240B29-F687-4f45-9708-019B960494DF}">
-                  <a14:hiddenLine xmlns:a14="http://schemas.microsoft.com/office/drawing/2010/main" xmlns="" w="9525">
+                  <a14:hiddenLine xmlns="" xmlns:a14="http://schemas.microsoft.com/office/drawing/2010/main" w="9525">
                     <a:solidFill>
                       <a:srgbClr val="000000"/>
                     </a:solidFill>
@@ -9999,7 +10089,7 @@
               </a:ln>
               <a:extLst>
                 <a:ext uri="{91240B29-F687-4f45-9708-019B960494DF}">
-                  <a14:hiddenLine xmlns:a14="http://schemas.microsoft.com/office/drawing/2010/main" xmlns="" w="9525">
+                  <a14:hiddenLine xmlns="" xmlns:a14="http://schemas.microsoft.com/office/drawing/2010/main" w="9525">
                     <a:solidFill>
                       <a:srgbClr val="000000"/>
                     </a:solidFill>
@@ -10061,7 +10151,7 @@
               </a:ln>
               <a:extLst>
                 <a:ext uri="{91240B29-F687-4f45-9708-019B960494DF}">
-                  <a14:hiddenLine xmlns:a14="http://schemas.microsoft.com/office/drawing/2010/main" xmlns="" w="9525">
+                  <a14:hiddenLine xmlns="" xmlns:a14="http://schemas.microsoft.com/office/drawing/2010/main" w="9525">
                     <a:solidFill>
                       <a:srgbClr val="000000"/>
                     </a:solidFill>
@@ -10151,7 +10241,7 @@
               </a:ln>
               <a:extLst>
                 <a:ext uri="{91240B29-F687-4f45-9708-019B960494DF}">
-                  <a14:hiddenLine xmlns:a14="http://schemas.microsoft.com/office/drawing/2010/main" xmlns="" w="9525">
+                  <a14:hiddenLine xmlns="" xmlns:a14="http://schemas.microsoft.com/office/drawing/2010/main" w="9525">
                     <a:solidFill>
                       <a:srgbClr val="000000"/>
                     </a:solidFill>
@@ -10241,7 +10331,7 @@
               </a:ln>
               <a:extLst>
                 <a:ext uri="{91240B29-F687-4f45-9708-019B960494DF}">
-                  <a14:hiddenLine xmlns:a14="http://schemas.microsoft.com/office/drawing/2010/main" xmlns="" w="9525">
+                  <a14:hiddenLine xmlns="" xmlns:a14="http://schemas.microsoft.com/office/drawing/2010/main" w="9525">
                     <a:solidFill>
                       <a:srgbClr val="000000"/>
                     </a:solidFill>
@@ -10303,7 +10393,7 @@
               </a:ln>
               <a:extLst>
                 <a:ext uri="{91240B29-F687-4f45-9708-019B960494DF}">
-                  <a14:hiddenLine xmlns:a14="http://schemas.microsoft.com/office/drawing/2010/main" xmlns="" w="9525">
+                  <a14:hiddenLine xmlns="" xmlns:a14="http://schemas.microsoft.com/office/drawing/2010/main" w="9525">
                     <a:solidFill>
                       <a:srgbClr val="000000"/>
                     </a:solidFill>
@@ -10413,7 +10503,7 @@
               </a:ln>
               <a:extLst>
                 <a:ext uri="{91240B29-F687-4f45-9708-019B960494DF}">
-                  <a14:hiddenLine xmlns:a14="http://schemas.microsoft.com/office/drawing/2010/main" xmlns="" w="9525">
+                  <a14:hiddenLine xmlns="" xmlns:a14="http://schemas.microsoft.com/office/drawing/2010/main" w="9525">
                     <a:solidFill>
                       <a:srgbClr val="000000"/>
                     </a:solidFill>
@@ -10497,7 +10587,7 @@
               </a:ln>
               <a:extLst>
                 <a:ext uri="{91240B29-F687-4f45-9708-019B960494DF}">
-                  <a14:hiddenLine xmlns:a14="http://schemas.microsoft.com/office/drawing/2010/main" xmlns="" w="9525">
+                  <a14:hiddenLine xmlns="" xmlns:a14="http://schemas.microsoft.com/office/drawing/2010/main" w="9525">
                     <a:solidFill>
                       <a:srgbClr val="000000"/>
                     </a:solidFill>
@@ -10559,7 +10649,7 @@
               </a:ln>
               <a:extLst>
                 <a:ext uri="{91240B29-F687-4f45-9708-019B960494DF}">
-                  <a14:hiddenLine xmlns:a14="http://schemas.microsoft.com/office/drawing/2010/main" xmlns="" w="9525">
+                  <a14:hiddenLine xmlns="" xmlns:a14="http://schemas.microsoft.com/office/drawing/2010/main" w="9525">
                     <a:solidFill>
                       <a:srgbClr val="000000"/>
                     </a:solidFill>
@@ -10621,7 +10711,7 @@
               </a:ln>
               <a:extLst>
                 <a:ext uri="{91240B29-F687-4f45-9708-019B960494DF}">
-                  <a14:hiddenLine xmlns:a14="http://schemas.microsoft.com/office/drawing/2010/main" xmlns="" w="9525">
+                  <a14:hiddenLine xmlns="" xmlns:a14="http://schemas.microsoft.com/office/drawing/2010/main" w="9525">
                     <a:solidFill>
                       <a:srgbClr val="000000"/>
                     </a:solidFill>
@@ -10711,7 +10801,7 @@
               </a:ln>
               <a:extLst>
                 <a:ext uri="{91240B29-F687-4f45-9708-019B960494DF}">
-                  <a14:hiddenLine xmlns:a14="http://schemas.microsoft.com/office/drawing/2010/main" xmlns="" w="9525">
+                  <a14:hiddenLine xmlns="" xmlns:a14="http://schemas.microsoft.com/office/drawing/2010/main" w="9525">
                     <a:solidFill>
                       <a:srgbClr val="000000"/>
                     </a:solidFill>
@@ -10745,7 +10835,7 @@
               </a:ln>
               <a:extLst>
                 <a:ext uri="{91240B29-F687-4f45-9708-019B960494DF}">
-                  <a14:hiddenLine xmlns:a14="http://schemas.microsoft.com/office/drawing/2010/main" xmlns="" w="9525">
+                  <a14:hiddenLine xmlns="" xmlns:a14="http://schemas.microsoft.com/office/drawing/2010/main" w="9525">
                     <a:solidFill>
                       <a:srgbClr val="000000"/>
                     </a:solidFill>
@@ -10810,7 +10900,7 @@
               </a:ln>
               <a:extLst>
                 <a:ext uri="{91240B29-F687-4f45-9708-019B960494DF}">
-                  <a14:hiddenLine xmlns:a14="http://schemas.microsoft.com/office/drawing/2010/main" xmlns="" w="9525">
+                  <a14:hiddenLine xmlns="" xmlns:a14="http://schemas.microsoft.com/office/drawing/2010/main" w="9525">
                     <a:solidFill>
                       <a:srgbClr val="000000"/>
                     </a:solidFill>
@@ -10900,7 +10990,7 @@
               </a:ln>
               <a:extLst>
                 <a:ext uri="{91240B29-F687-4f45-9708-019B960494DF}">
-                  <a14:hiddenLine xmlns:a14="http://schemas.microsoft.com/office/drawing/2010/main" xmlns="" w="9525">
+                  <a14:hiddenLine xmlns="" xmlns:a14="http://schemas.microsoft.com/office/drawing/2010/main" w="9525">
                     <a:solidFill>
                       <a:srgbClr val="000000"/>
                     </a:solidFill>
@@ -10962,7 +11052,7 @@
               </a:ln>
               <a:extLst>
                 <a:ext uri="{91240B29-F687-4f45-9708-019B960494DF}">
-                  <a14:hiddenLine xmlns:a14="http://schemas.microsoft.com/office/drawing/2010/main" xmlns="" w="9525">
+                  <a14:hiddenLine xmlns="" xmlns:a14="http://schemas.microsoft.com/office/drawing/2010/main" w="9525">
                     <a:solidFill>
                       <a:srgbClr val="000000"/>
                     </a:solidFill>
@@ -11052,7 +11142,7 @@
               </a:ln>
               <a:extLst>
                 <a:ext uri="{91240B29-F687-4f45-9708-019B960494DF}">
-                  <a14:hiddenLine xmlns:a14="http://schemas.microsoft.com/office/drawing/2010/main" xmlns="" w="9525">
+                  <a14:hiddenLine xmlns="" xmlns:a14="http://schemas.microsoft.com/office/drawing/2010/main" w="9525">
                     <a:solidFill>
                       <a:srgbClr val="000000"/>
                     </a:solidFill>
@@ -11117,7 +11207,7 @@
               </a:ln>
               <a:extLst>
                 <a:ext uri="{91240B29-F687-4f45-9708-019B960494DF}">
-                  <a14:hiddenLine xmlns:a14="http://schemas.microsoft.com/office/drawing/2010/main" xmlns="" w="9525">
+                  <a14:hiddenLine xmlns="" xmlns:a14="http://schemas.microsoft.com/office/drawing/2010/main" w="9525">
                     <a:solidFill>
                       <a:srgbClr val="000000"/>
                     </a:solidFill>
@@ -11179,7 +11269,7 @@
               </a:ln>
               <a:extLst>
                 <a:ext uri="{91240B29-F687-4f45-9708-019B960494DF}">
-                  <a14:hiddenLine xmlns:a14="http://schemas.microsoft.com/office/drawing/2010/main" xmlns="" w="9525">
+                  <a14:hiddenLine xmlns="" xmlns:a14="http://schemas.microsoft.com/office/drawing/2010/main" w="9525">
                     <a:solidFill>
                       <a:srgbClr val="000000"/>
                     </a:solidFill>
@@ -11269,7 +11359,7 @@
               </a:ln>
               <a:extLst>
                 <a:ext uri="{91240B29-F687-4f45-9708-019B960494DF}">
-                  <a14:hiddenLine xmlns:a14="http://schemas.microsoft.com/office/drawing/2010/main" xmlns="" w="9525">
+                  <a14:hiddenLine xmlns="" xmlns:a14="http://schemas.microsoft.com/office/drawing/2010/main" w="9525">
                     <a:solidFill>
                       <a:srgbClr val="000000"/>
                     </a:solidFill>
@@ -11359,7 +11449,7 @@
               </a:ln>
               <a:extLst>
                 <a:ext uri="{91240B29-F687-4f45-9708-019B960494DF}">
-                  <a14:hiddenLine xmlns:a14="http://schemas.microsoft.com/office/drawing/2010/main" xmlns="" w="9525">
+                  <a14:hiddenLine xmlns="" xmlns:a14="http://schemas.microsoft.com/office/drawing/2010/main" w="9525">
                     <a:solidFill>
                       <a:srgbClr val="000000"/>
                     </a:solidFill>
@@ -11424,7 +11514,7 @@
               </a:ln>
               <a:extLst>
                 <a:ext uri="{91240B29-F687-4f45-9708-019B960494DF}">
-                  <a14:hiddenLine xmlns:a14="http://schemas.microsoft.com/office/drawing/2010/main" xmlns="" w="9525">
+                  <a14:hiddenLine xmlns="" xmlns:a14="http://schemas.microsoft.com/office/drawing/2010/main" w="9525">
                     <a:solidFill>
                       <a:srgbClr val="000000"/>
                     </a:solidFill>
@@ -11544,7 +11634,7 @@
               </a:ln>
               <a:extLst>
                 <a:ext uri="{91240B29-F687-4f45-9708-019B960494DF}">
-                  <a14:hiddenLine xmlns:a14="http://schemas.microsoft.com/office/drawing/2010/main" xmlns="" w="9525">
+                  <a14:hiddenLine xmlns="" xmlns:a14="http://schemas.microsoft.com/office/drawing/2010/main" w="9525">
                     <a:solidFill>
                       <a:srgbClr val="000000"/>
                     </a:solidFill>
@@ -11642,7 +11732,7 @@
               </a:ln>
               <a:extLst>
                 <a:ext uri="{91240B29-F687-4f45-9708-019B960494DF}">
-                  <a14:hiddenLine xmlns:a14="http://schemas.microsoft.com/office/drawing/2010/main" xmlns="" w="9525">
+                  <a14:hiddenLine xmlns="" xmlns:a14="http://schemas.microsoft.com/office/drawing/2010/main" w="9525">
                     <a:solidFill>
                       <a:srgbClr val="000000"/>
                     </a:solidFill>
@@ -11757,7 +11847,7 @@
               </a:ln>
               <a:extLst>
                 <a:ext uri="{91240B29-F687-4f45-9708-019B960494DF}">
-                  <a14:hiddenLine xmlns:a14="http://schemas.microsoft.com/office/drawing/2010/main" xmlns="" w="9525">
+                  <a14:hiddenLine xmlns="" xmlns:a14="http://schemas.microsoft.com/office/drawing/2010/main" w="9525">
                     <a:solidFill>
                       <a:srgbClr val="000000"/>
                     </a:solidFill>
@@ -11847,7 +11937,7 @@
               </a:ln>
               <a:extLst>
                 <a:ext uri="{91240B29-F687-4f45-9708-019B960494DF}">
-                  <a14:hiddenLine xmlns:a14="http://schemas.microsoft.com/office/drawing/2010/main" xmlns="" w="9525">
+                  <a14:hiddenLine xmlns="" xmlns:a14="http://schemas.microsoft.com/office/drawing/2010/main" w="9525">
                     <a:solidFill>
                       <a:srgbClr val="000000"/>
                     </a:solidFill>
@@ -11912,7 +12002,7 @@
               </a:ln>
               <a:extLst>
                 <a:ext uri="{91240B29-F687-4f45-9708-019B960494DF}">
-                  <a14:hiddenLine xmlns:a14="http://schemas.microsoft.com/office/drawing/2010/main" xmlns="" w="9525">
+                  <a14:hiddenLine xmlns="" xmlns:a14="http://schemas.microsoft.com/office/drawing/2010/main" w="9525">
                     <a:solidFill>
                       <a:srgbClr val="000000"/>
                     </a:solidFill>
@@ -12002,7 +12092,7 @@
               </a:ln>
               <a:extLst>
                 <a:ext uri="{91240B29-F687-4f45-9708-019B960494DF}">
-                  <a14:hiddenLine xmlns:a14="http://schemas.microsoft.com/office/drawing/2010/main" xmlns="" w="9525">
+                  <a14:hiddenLine xmlns="" xmlns:a14="http://schemas.microsoft.com/office/drawing/2010/main" w="9525">
                     <a:solidFill>
                       <a:srgbClr val="000000"/>
                     </a:solidFill>
@@ -12070,7 +12160,7 @@
               </a:ln>
               <a:extLst>
                 <a:ext uri="{91240B29-F687-4f45-9708-019B960494DF}">
-                  <a14:hiddenLine xmlns:a14="http://schemas.microsoft.com/office/drawing/2010/main" xmlns="" w="9525">
+                  <a14:hiddenLine xmlns="" xmlns:a14="http://schemas.microsoft.com/office/drawing/2010/main" w="9525">
                     <a:solidFill>
                       <a:srgbClr val="000000"/>
                     </a:solidFill>
@@ -12160,7 +12250,7 @@
               </a:ln>
               <a:extLst>
                 <a:ext uri="{91240B29-F687-4f45-9708-019B960494DF}">
-                  <a14:hiddenLine xmlns:a14="http://schemas.microsoft.com/office/drawing/2010/main" xmlns="" w="9525">
+                  <a14:hiddenLine xmlns="" xmlns:a14="http://schemas.microsoft.com/office/drawing/2010/main" w="9525">
                     <a:solidFill>
                       <a:srgbClr val="000000"/>
                     </a:solidFill>
@@ -12228,7 +12318,7 @@
               </a:ln>
               <a:extLst>
                 <a:ext uri="{91240B29-F687-4f45-9708-019B960494DF}">
-                  <a14:hiddenLine xmlns:a14="http://schemas.microsoft.com/office/drawing/2010/main" xmlns="" w="9525">
+                  <a14:hiddenLine xmlns="" xmlns:a14="http://schemas.microsoft.com/office/drawing/2010/main" w="9525">
                     <a:solidFill>
                       <a:srgbClr val="000000"/>
                     </a:solidFill>
@@ -12318,7 +12408,7 @@
               </a:ln>
               <a:extLst>
                 <a:ext uri="{91240B29-F687-4f45-9708-019B960494DF}">
-                  <a14:hiddenLine xmlns:a14="http://schemas.microsoft.com/office/drawing/2010/main" xmlns="" w="9525">
+                  <a14:hiddenLine xmlns="" xmlns:a14="http://schemas.microsoft.com/office/drawing/2010/main" w="9525">
                     <a:solidFill>
                       <a:srgbClr val="000000"/>
                     </a:solidFill>
@@ -12352,7 +12442,7 @@
               </a:ln>
               <a:extLst>
                 <a:ext uri="{91240B29-F687-4f45-9708-019B960494DF}">
-                  <a14:hiddenLine xmlns:a14="http://schemas.microsoft.com/office/drawing/2010/main" xmlns="" w="9525">
+                  <a14:hiddenLine xmlns="" xmlns:a14="http://schemas.microsoft.com/office/drawing/2010/main" w="9525">
                     <a:solidFill>
                       <a:srgbClr val="000000"/>
                     </a:solidFill>
@@ -12493,7 +12583,7 @@
             <a:fld id="{48A87A34-81AB-432B-8DAE-1953F412C126}" type="datetimeFigureOut">
               <a:rPr lang="en-US" dirty="0"/>
               <a:pPr/>
-              <a:t>10/13/2018</a:t>
+              <a:t>10/27/2018</a:t>
             </a:fld>
             <a:endParaRPr lang="en-US" dirty="0"/>
           </a:p>
@@ -13039,7 +13129,7 @@
           <a:p>
             <a:r>
               <a:rPr lang="en-US" dirty="0"/>
-              <a:t>Launch EC2 Instance (Cont’d)</a:t>
+              <a:t>Launch EC2 Instance</a:t>
             </a:r>
             <a:endParaRPr lang="en-CA" dirty="0"/>
           </a:p>
@@ -13050,7 +13140,7 @@
           <p:cNvPr id="4" name="Content Placeholder 3" descr="A screenshot of a social media post&#10;&#10;Description generated with very high confidence">
             <a:extLst>
               <a:ext uri="{FF2B5EF4-FFF2-40B4-BE49-F238E27FC236}">
-                <a16:creationId xmlns:a16="http://schemas.microsoft.com/office/drawing/2014/main" id="{D1081A80-F12E-46D8-975B-4A397ECBD40C}"/>
+                <a16:creationId xmlns:a16="http://schemas.microsoft.com/office/drawing/2014/main" id="{9AD40995-2CFC-4BE3-84B1-D24296926452}"/>
               </a:ext>
             </a:extLst>
           </p:cNvPr>
@@ -13058,7 +13148,7 @@
             <a:picLocks noGrp="1" noChangeAspect="1"/>
           </p:cNvPicPr>
           <p:nvPr>
-            <p:ph sz="half" idx="1"/>
+            <p:ph idx="1"/>
           </p:nvPr>
         </p:nvPicPr>
         <p:blipFill>
@@ -13069,54 +13159,15 @@
         </p:blipFill>
         <p:spPr>
           <a:xfrm>
-            <a:off x="1141413" y="2688197"/>
-            <a:ext cx="4878387" cy="2664293"/>
+            <a:off x="1488242" y="1741488"/>
+            <a:ext cx="9212340" cy="4689792"/>
           </a:xfrm>
         </p:spPr>
       </p:pic>
-      <p:sp>
-        <p:nvSpPr>
-          <p:cNvPr id="6" name="Content Placeholder 5">
-            <a:extLst>
-              <a:ext uri="{FF2B5EF4-FFF2-40B4-BE49-F238E27FC236}">
-                <a16:creationId xmlns:a16="http://schemas.microsoft.com/office/drawing/2014/main" id="{7964C845-B95A-4995-902D-FDC8EB6E7288}"/>
-              </a:ext>
-            </a:extLst>
-          </p:cNvPr>
-          <p:cNvSpPr>
-            <a:spLocks noGrp="1"/>
-          </p:cNvSpPr>
-          <p:nvPr>
-            <p:ph sz="half" idx="2"/>
-          </p:nvPr>
-        </p:nvSpPr>
-        <p:spPr/>
-        <p:txBody>
-          <a:bodyPr>
-            <a:normAutofit/>
-          </a:bodyPr>
-          <a:lstStyle/>
-          <a:p>
-            <a:r>
-              <a:rPr lang="en-US" dirty="0"/>
-              <a:t>All services that offer a free tier have limits on what you can use without being charged. Many services have multiple types of limits. </a:t>
-            </a:r>
-          </a:p>
-          <a:p>
-            <a:r>
-              <a:rPr lang="en-US" dirty="0"/>
-              <a:t>EC2 has limits on both the type of instance you can use and how many hours you can use in one month</a:t>
-            </a:r>
-          </a:p>
-          <a:p>
-            <a:endParaRPr lang="en-CA" dirty="0"/>
-          </a:p>
-        </p:txBody>
-      </p:sp>
     </p:spTree>
     <p:extLst>
       <p:ext uri="{BB962C8B-B14F-4D97-AF65-F5344CB8AC3E}">
-        <p14:creationId xmlns:p14="http://schemas.microsoft.com/office/powerpoint/2010/main" val="3492405517"/>
+        <p14:creationId xmlns:p14="http://schemas.microsoft.com/office/powerpoint/2010/main" val="358460276"/>
       </p:ext>
     </p:extLst>
   </p:cSld>
@@ -13174,10 +13225,10 @@
       </p:sp>
       <p:pic>
         <p:nvPicPr>
-          <p:cNvPr id="9" name="Content Placeholder 8" descr="A screenshot of a computer screen&#10;&#10;Description generated with very high confidence">
+          <p:cNvPr id="4" name="Content Placeholder 3" descr="A screenshot of a social media post&#10;&#10;Description generated with very high confidence">
             <a:extLst>
               <a:ext uri="{FF2B5EF4-FFF2-40B4-BE49-F238E27FC236}">
-                <a16:creationId xmlns:a16="http://schemas.microsoft.com/office/drawing/2014/main" id="{AEB866FE-5440-446A-9C55-83979AD39E42}"/>
+                <a16:creationId xmlns:a16="http://schemas.microsoft.com/office/drawing/2014/main" id="{D1081A80-F12E-46D8-975B-4A397ECBD40C}"/>
               </a:ext>
             </a:extLst>
           </p:cNvPr>
@@ -13185,7 +13236,7 @@
             <a:picLocks noGrp="1" noChangeAspect="1"/>
           </p:cNvPicPr>
           <p:nvPr>
-            <p:ph idx="1"/>
+            <p:ph sz="half" idx="1"/>
           </p:nvPr>
         </p:nvPicPr>
         <p:blipFill>
@@ -13196,15 +13247,54 @@
         </p:blipFill>
         <p:spPr>
           <a:xfrm>
-            <a:off x="2851931" y="2249488"/>
-            <a:ext cx="6484963" cy="3541712"/>
+            <a:off x="1141413" y="2688197"/>
+            <a:ext cx="4878387" cy="2664293"/>
           </a:xfrm>
         </p:spPr>
       </p:pic>
+      <p:sp>
+        <p:nvSpPr>
+          <p:cNvPr id="6" name="Content Placeholder 5">
+            <a:extLst>
+              <a:ext uri="{FF2B5EF4-FFF2-40B4-BE49-F238E27FC236}">
+                <a16:creationId xmlns:a16="http://schemas.microsoft.com/office/drawing/2014/main" id="{7964C845-B95A-4995-902D-FDC8EB6E7288}"/>
+              </a:ext>
+            </a:extLst>
+          </p:cNvPr>
+          <p:cNvSpPr>
+            <a:spLocks noGrp="1"/>
+          </p:cNvSpPr>
+          <p:nvPr>
+            <p:ph sz="half" idx="2"/>
+          </p:nvPr>
+        </p:nvSpPr>
+        <p:spPr/>
+        <p:txBody>
+          <a:bodyPr>
+            <a:normAutofit/>
+          </a:bodyPr>
+          <a:lstStyle/>
+          <a:p>
+            <a:r>
+              <a:rPr lang="en-US" dirty="0"/>
+              <a:t>All services that offer a free tier have limits on what you can use without being charged. Many services have multiple types of limits. </a:t>
+            </a:r>
+          </a:p>
+          <a:p>
+            <a:r>
+              <a:rPr lang="en-US" dirty="0"/>
+              <a:t>EC2 has limits on both the type of instance you can use and how many hours you can use in one month</a:t>
+            </a:r>
+          </a:p>
+          <a:p>
+            <a:endParaRPr lang="en-CA" dirty="0"/>
+          </a:p>
+        </p:txBody>
+      </p:sp>
     </p:spTree>
     <p:extLst>
       <p:ext uri="{BB962C8B-B14F-4D97-AF65-F5344CB8AC3E}">
-        <p14:creationId xmlns:p14="http://schemas.microsoft.com/office/powerpoint/2010/main" val="1489765602"/>
+        <p14:creationId xmlns:p14="http://schemas.microsoft.com/office/powerpoint/2010/main" val="3492405517"/>
       </p:ext>
     </p:extLst>
   </p:cSld>
@@ -13262,10 +13352,10 @@
       </p:sp>
       <p:pic>
         <p:nvPicPr>
-          <p:cNvPr id="11" name="Content Placeholder 10" descr="A screenshot of a computer&#10;&#10;Description generated with very high confidence">
+          <p:cNvPr id="9" name="Content Placeholder 8" descr="A screenshot of a computer screen&#10;&#10;Description generated with very high confidence">
             <a:extLst>
               <a:ext uri="{FF2B5EF4-FFF2-40B4-BE49-F238E27FC236}">
-                <a16:creationId xmlns:a16="http://schemas.microsoft.com/office/drawing/2014/main" id="{9E23182D-C242-4112-8032-E28B949FA6FA}"/>
+                <a16:creationId xmlns:a16="http://schemas.microsoft.com/office/drawing/2014/main" id="{AEB866FE-5440-446A-9C55-83979AD39E42}"/>
               </a:ext>
             </a:extLst>
           </p:cNvPr>
@@ -13292,7 +13382,7 @@
     </p:spTree>
     <p:extLst>
       <p:ext uri="{BB962C8B-B14F-4D97-AF65-F5344CB8AC3E}">
-        <p14:creationId xmlns:p14="http://schemas.microsoft.com/office/powerpoint/2010/main" val="1272857133"/>
+        <p14:creationId xmlns:p14="http://schemas.microsoft.com/office/powerpoint/2010/main" val="1489765602"/>
       </p:ext>
     </p:extLst>
   </p:cSld>
@@ -13350,10 +13440,10 @@
       </p:sp>
       <p:pic>
         <p:nvPicPr>
-          <p:cNvPr id="4" name="Content Placeholder 3" descr="A screenshot of a computer screen&#10;&#10;Description generated with very high confidence">
+          <p:cNvPr id="11" name="Content Placeholder 10" descr="A screenshot of a computer&#10;&#10;Description generated with very high confidence">
             <a:extLst>
               <a:ext uri="{FF2B5EF4-FFF2-40B4-BE49-F238E27FC236}">
-                <a16:creationId xmlns:a16="http://schemas.microsoft.com/office/drawing/2014/main" id="{50FEB44F-091A-41D1-A766-723569D2B755}"/>
+                <a16:creationId xmlns:a16="http://schemas.microsoft.com/office/drawing/2014/main" id="{9E23182D-C242-4112-8032-E28B949FA6FA}"/>
               </a:ext>
             </a:extLst>
           </p:cNvPr>
@@ -13372,15 +13462,15 @@
         </p:blipFill>
         <p:spPr>
           <a:xfrm>
-            <a:off x="2851932" y="2249488"/>
-            <a:ext cx="6484962" cy="3541712"/>
+            <a:off x="2851931" y="2249488"/>
+            <a:ext cx="6484963" cy="3541712"/>
           </a:xfrm>
         </p:spPr>
       </p:pic>
     </p:spTree>
     <p:extLst>
       <p:ext uri="{BB962C8B-B14F-4D97-AF65-F5344CB8AC3E}">
-        <p14:creationId xmlns:p14="http://schemas.microsoft.com/office/powerpoint/2010/main" val="2912589424"/>
+        <p14:creationId xmlns:p14="http://schemas.microsoft.com/office/powerpoint/2010/main" val="1272857133"/>
       </p:ext>
     </p:extLst>
   </p:cSld>
@@ -13438,10 +13528,10 @@
       </p:sp>
       <p:pic>
         <p:nvPicPr>
-          <p:cNvPr id="4" name="Content Placeholder 3" descr="A screenshot of a social media post&#10;&#10;Description generated with very high confidence">
+          <p:cNvPr id="4" name="Content Placeholder 3" descr="A screenshot of a computer screen&#10;&#10;Description generated with very high confidence">
             <a:extLst>
               <a:ext uri="{FF2B5EF4-FFF2-40B4-BE49-F238E27FC236}">
-                <a16:creationId xmlns:a16="http://schemas.microsoft.com/office/drawing/2014/main" id="{9E0D396D-ADF9-4714-8004-2EC6BDBC8C77}"/>
+                <a16:creationId xmlns:a16="http://schemas.microsoft.com/office/drawing/2014/main" id="{50FEB44F-091A-41D1-A766-723569D2B755}"/>
               </a:ext>
             </a:extLst>
           </p:cNvPr>
@@ -13468,7 +13558,7 @@
     </p:spTree>
     <p:extLst>
       <p:ext uri="{BB962C8B-B14F-4D97-AF65-F5344CB8AC3E}">
-        <p14:creationId xmlns:p14="http://schemas.microsoft.com/office/powerpoint/2010/main" val="1181632865"/>
+        <p14:creationId xmlns:p14="http://schemas.microsoft.com/office/powerpoint/2010/main" val="2912589424"/>
       </p:ext>
     </p:extLst>
   </p:cSld>
@@ -13526,10 +13616,10 @@
       </p:sp>
       <p:pic>
         <p:nvPicPr>
-          <p:cNvPr id="4" name="Content Placeholder 3" descr="A screenshot of a computer screen&#10;&#10;Description generated with very high confidence">
+          <p:cNvPr id="4" name="Content Placeholder 3" descr="A screenshot of a social media post&#10;&#10;Description generated with very high confidence">
             <a:extLst>
               <a:ext uri="{FF2B5EF4-FFF2-40B4-BE49-F238E27FC236}">
-                <a16:creationId xmlns:a16="http://schemas.microsoft.com/office/drawing/2014/main" id="{D5393727-E590-46B6-9D13-EAE1D7628F6B}"/>
+                <a16:creationId xmlns:a16="http://schemas.microsoft.com/office/drawing/2014/main" id="{9E0D396D-ADF9-4714-8004-2EC6BDBC8C77}"/>
               </a:ext>
             </a:extLst>
           </p:cNvPr>
@@ -13556,7 +13646,7 @@
     </p:spTree>
     <p:extLst>
       <p:ext uri="{BB962C8B-B14F-4D97-AF65-F5344CB8AC3E}">
-        <p14:creationId xmlns:p14="http://schemas.microsoft.com/office/powerpoint/2010/main" val="470698280"/>
+        <p14:creationId xmlns:p14="http://schemas.microsoft.com/office/powerpoint/2010/main" val="1181632865"/>
       </p:ext>
     </p:extLst>
   </p:cSld>
@@ -13617,7 +13707,7 @@
           <p:cNvPr id="4" name="Content Placeholder 3" descr="A screenshot of a computer screen&#10;&#10;Description generated with very high confidence">
             <a:extLst>
               <a:ext uri="{FF2B5EF4-FFF2-40B4-BE49-F238E27FC236}">
-                <a16:creationId xmlns:a16="http://schemas.microsoft.com/office/drawing/2014/main" id="{A252A0E2-E633-426A-9535-A939E21EDFB4}"/>
+                <a16:creationId xmlns:a16="http://schemas.microsoft.com/office/drawing/2014/main" id="{D5393727-E590-46B6-9D13-EAE1D7628F6B}"/>
               </a:ext>
             </a:extLst>
           </p:cNvPr>
@@ -13644,7 +13734,7 @@
     </p:spTree>
     <p:extLst>
       <p:ext uri="{BB962C8B-B14F-4D97-AF65-F5344CB8AC3E}">
-        <p14:creationId xmlns:p14="http://schemas.microsoft.com/office/powerpoint/2010/main" val="3289240948"/>
+        <p14:creationId xmlns:p14="http://schemas.microsoft.com/office/powerpoint/2010/main" val="470698280"/>
       </p:ext>
     </p:extLst>
   </p:cSld>
@@ -13702,10 +13792,10 @@
       </p:sp>
       <p:pic>
         <p:nvPicPr>
-          <p:cNvPr id="4" name="Content Placeholder 3" descr="A screenshot of a computer&#10;&#10;Description generated with very high confidence">
+          <p:cNvPr id="4" name="Content Placeholder 3" descr="A screenshot of a computer screen&#10;&#10;Description generated with very high confidence">
             <a:extLst>
               <a:ext uri="{FF2B5EF4-FFF2-40B4-BE49-F238E27FC236}">
-                <a16:creationId xmlns:a16="http://schemas.microsoft.com/office/drawing/2014/main" id="{D68EF756-AD8C-44B7-AA83-B0D24512EC48}"/>
+                <a16:creationId xmlns:a16="http://schemas.microsoft.com/office/drawing/2014/main" id="{A252A0E2-E633-426A-9535-A939E21EDFB4}"/>
               </a:ext>
             </a:extLst>
           </p:cNvPr>
@@ -13732,7 +13822,7 @@
     </p:spTree>
     <p:extLst>
       <p:ext uri="{BB962C8B-B14F-4D97-AF65-F5344CB8AC3E}">
-        <p14:creationId xmlns:p14="http://schemas.microsoft.com/office/powerpoint/2010/main" val="2108673231"/>
+        <p14:creationId xmlns:p14="http://schemas.microsoft.com/office/powerpoint/2010/main" val="3289240948"/>
       </p:ext>
     </p:extLst>
   </p:cSld>
@@ -13790,10 +13880,10 @@
       </p:sp>
       <p:pic>
         <p:nvPicPr>
-          <p:cNvPr id="7" name="Content Placeholder 6" descr="A screenshot of a social media post&#10;&#10;Description generated with very high confidence">
+          <p:cNvPr id="4" name="Content Placeholder 3" descr="A screenshot of a computer&#10;&#10;Description generated with very high confidence">
             <a:extLst>
               <a:ext uri="{FF2B5EF4-FFF2-40B4-BE49-F238E27FC236}">
-                <a16:creationId xmlns:a16="http://schemas.microsoft.com/office/drawing/2014/main" id="{450ADD56-4CE5-444E-8E48-3970DFD8CF9B}"/>
+                <a16:creationId xmlns:a16="http://schemas.microsoft.com/office/drawing/2014/main" id="{D68EF756-AD8C-44B7-AA83-B0D24512EC48}"/>
               </a:ext>
             </a:extLst>
           </p:cNvPr>
@@ -13812,15 +13902,15 @@
         </p:blipFill>
         <p:spPr>
           <a:xfrm>
-            <a:off x="3156055" y="2249488"/>
-            <a:ext cx="5876715" cy="3541712"/>
+            <a:off x="2851932" y="2249488"/>
+            <a:ext cx="6484962" cy="3541712"/>
           </a:xfrm>
         </p:spPr>
       </p:pic>
     </p:spTree>
     <p:extLst>
       <p:ext uri="{BB962C8B-B14F-4D97-AF65-F5344CB8AC3E}">
-        <p14:creationId xmlns:p14="http://schemas.microsoft.com/office/powerpoint/2010/main" val="3139880549"/>
+        <p14:creationId xmlns:p14="http://schemas.microsoft.com/office/powerpoint/2010/main" val="2108673231"/>
       </p:ext>
     </p:extLst>
   </p:cSld>
@@ -13878,10 +13968,10 @@
       </p:sp>
       <p:pic>
         <p:nvPicPr>
-          <p:cNvPr id="4" name="Content Placeholder 3" descr="A screenshot of a computer&#10;&#10;Description generated with very high confidence">
+          <p:cNvPr id="7" name="Content Placeholder 6" descr="A screenshot of a social media post&#10;&#10;Description generated with very high confidence">
             <a:extLst>
               <a:ext uri="{FF2B5EF4-FFF2-40B4-BE49-F238E27FC236}">
-                <a16:creationId xmlns:a16="http://schemas.microsoft.com/office/drawing/2014/main" id="{3C748AC9-7A53-483F-BEE3-8E5ADEF5DE87}"/>
+                <a16:creationId xmlns:a16="http://schemas.microsoft.com/office/drawing/2014/main" id="{450ADD56-4CE5-444E-8E48-3970DFD8CF9B}"/>
               </a:ext>
             </a:extLst>
           </p:cNvPr>
@@ -13900,15 +13990,15 @@
         </p:blipFill>
         <p:spPr>
           <a:xfrm>
-            <a:off x="2725126" y="2249488"/>
-            <a:ext cx="6738573" cy="3541712"/>
+            <a:off x="3156055" y="2249488"/>
+            <a:ext cx="5876715" cy="3541712"/>
           </a:xfrm>
         </p:spPr>
       </p:pic>
     </p:spTree>
     <p:extLst>
       <p:ext uri="{BB962C8B-B14F-4D97-AF65-F5344CB8AC3E}">
-        <p14:creationId xmlns:p14="http://schemas.microsoft.com/office/powerpoint/2010/main" val="3249714778"/>
+        <p14:creationId xmlns:p14="http://schemas.microsoft.com/office/powerpoint/2010/main" val="3139880549"/>
       </p:ext>
     </p:extLst>
   </p:cSld>
@@ -13940,7 +14030,7 @@
           <p:cNvPr id="2" name="Title 1">
             <a:extLst>
               <a:ext uri="{FF2B5EF4-FFF2-40B4-BE49-F238E27FC236}">
-                <a16:creationId xmlns:a16="http://schemas.microsoft.com/office/drawing/2014/main" id="{EE85C323-4018-4E77-8E62-60F0CB50B799}"/>
+                <a16:creationId xmlns:a16="http://schemas.microsoft.com/office/drawing/2014/main" id="{5D69F76F-8D5A-406B-82DF-21E0E7FAF5AB}"/>
               </a:ext>
             </a:extLst>
           </p:cNvPr>
@@ -13958,21 +14048,18 @@
           <a:p>
             <a:r>
               <a:rPr lang="en-US" dirty="0"/>
-              <a:t>Class Activity 01 – AWS Ec2 Instance Basics Workshop</a:t>
+              <a:t>What is AWS Ec2?</a:t>
             </a:r>
-            <a:br>
-              <a:rPr lang="en-US" dirty="0"/>
-            </a:br>
             <a:endParaRPr lang="en-CA" dirty="0"/>
           </a:p>
         </p:txBody>
       </p:sp>
       <p:sp>
         <p:nvSpPr>
-          <p:cNvPr id="3" name="Text Placeholder 2">
+          <p:cNvPr id="3" name="Content Placeholder 2">
             <a:extLst>
               <a:ext uri="{FF2B5EF4-FFF2-40B4-BE49-F238E27FC236}">
-                <a16:creationId xmlns:a16="http://schemas.microsoft.com/office/drawing/2014/main" id="{48B221F8-55A8-4568-AD15-0153F5471B2E}"/>
+                <a16:creationId xmlns:a16="http://schemas.microsoft.com/office/drawing/2014/main" id="{F5AD99BD-CCE6-472C-B104-018ABC5582D6}"/>
               </a:ext>
             </a:extLst>
           </p:cNvPr>
@@ -13980,26 +14067,45 @@
             <a:spLocks noGrp="1"/>
           </p:cNvSpPr>
           <p:nvPr>
-            <p:ph type="body" idx="1"/>
+            <p:ph idx="1"/>
           </p:nvPr>
         </p:nvSpPr>
         <p:spPr/>
         <p:txBody>
-          <a:bodyPr/>
+          <a:bodyPr>
+            <a:normAutofit/>
+          </a:bodyPr>
           <a:lstStyle/>
           <a:p>
             <a:r>
               <a:rPr lang="en-US" dirty="0"/>
-              <a:t>Creating Amazon Ec2 Key Pairs</a:t>
+              <a:t>Amazon Elastic Compute Cloud (Amazon EC2) is a web service that provides on-demand and scalable computing service in the cloud</a:t>
             </a:r>
-            <a:endParaRPr lang="en-CA" dirty="0"/>
+          </a:p>
+          <a:p>
+            <a:r>
+              <a:rPr lang="en-US" dirty="0"/>
+              <a:t>AWS EC2 allows you to create and run virtual machines on AWS infrastructure</a:t>
+            </a:r>
+          </a:p>
+          <a:p>
+            <a:r>
+              <a:rPr lang="en-US" dirty="0"/>
+              <a:t>Virtual machine: software computer, like a physical computer, runs an operating system and applications</a:t>
+            </a:r>
+          </a:p>
+          <a:p>
+            <a:r>
+              <a:rPr lang="en-US" dirty="0"/>
+              <a:t>Choose a VM that fits your need and gain the performance of AWS’s worldwide network</a:t>
+            </a:r>
           </a:p>
         </p:txBody>
       </p:sp>
     </p:spTree>
     <p:extLst>
       <p:ext uri="{BB962C8B-B14F-4D97-AF65-F5344CB8AC3E}">
-        <p14:creationId xmlns:p14="http://schemas.microsoft.com/office/powerpoint/2010/main" val="2137269704"/>
+        <p14:creationId xmlns:p14="http://schemas.microsoft.com/office/powerpoint/2010/main" val="2078142979"/>
       </p:ext>
     </p:extLst>
   </p:cSld>
@@ -14057,10 +14163,10 @@
       </p:sp>
       <p:pic>
         <p:nvPicPr>
-          <p:cNvPr id="4" name="Content Placeholder 3" descr="A screenshot of a computer screen&#10;&#10;Description generated with very high confidence">
+          <p:cNvPr id="4" name="Content Placeholder 3" descr="A screenshot of a computer&#10;&#10;Description generated with very high confidence">
             <a:extLst>
               <a:ext uri="{FF2B5EF4-FFF2-40B4-BE49-F238E27FC236}">
-                <a16:creationId xmlns:a16="http://schemas.microsoft.com/office/drawing/2014/main" id="{B460D692-0AC5-438E-B0D0-8C95F37E1848}"/>
+                <a16:creationId xmlns:a16="http://schemas.microsoft.com/office/drawing/2014/main" id="{3C748AC9-7A53-483F-BEE3-8E5ADEF5DE87}"/>
               </a:ext>
             </a:extLst>
           </p:cNvPr>
@@ -14087,7 +14193,7 @@
     </p:spTree>
     <p:extLst>
       <p:ext uri="{BB962C8B-B14F-4D97-AF65-F5344CB8AC3E}">
-        <p14:creationId xmlns:p14="http://schemas.microsoft.com/office/powerpoint/2010/main" val="2984570693"/>
+        <p14:creationId xmlns:p14="http://schemas.microsoft.com/office/powerpoint/2010/main" val="3249714778"/>
       </p:ext>
     </p:extLst>
   </p:cSld>
@@ -14145,10 +14251,10 @@
       </p:sp>
       <p:pic>
         <p:nvPicPr>
-          <p:cNvPr id="4" name="Content Placeholder 3" descr="A screenshot of a computer&#10;&#10;Description generated with very high confidence">
+          <p:cNvPr id="4" name="Content Placeholder 3" descr="A screenshot of a computer screen&#10;&#10;Description generated with very high confidence">
             <a:extLst>
               <a:ext uri="{FF2B5EF4-FFF2-40B4-BE49-F238E27FC236}">
-                <a16:creationId xmlns:a16="http://schemas.microsoft.com/office/drawing/2014/main" id="{8011D9E2-EA91-418B-8BE9-DDD5CB80F3B1}"/>
+                <a16:creationId xmlns:a16="http://schemas.microsoft.com/office/drawing/2014/main" id="{B460D692-0AC5-438E-B0D0-8C95F37E1848}"/>
               </a:ext>
             </a:extLst>
           </p:cNvPr>
@@ -14175,7 +14281,7 @@
     </p:spTree>
     <p:extLst>
       <p:ext uri="{BB962C8B-B14F-4D97-AF65-F5344CB8AC3E}">
-        <p14:creationId xmlns:p14="http://schemas.microsoft.com/office/powerpoint/2010/main" val="3755271365"/>
+        <p14:creationId xmlns:p14="http://schemas.microsoft.com/office/powerpoint/2010/main" val="2984570693"/>
       </p:ext>
     </p:extLst>
   </p:cSld>
@@ -14204,10 +14310,10 @@
       </p:grpSpPr>
       <p:sp>
         <p:nvSpPr>
-          <p:cNvPr id="2" name="Title 1">
+          <p:cNvPr id="5" name="Title 4">
             <a:extLst>
               <a:ext uri="{FF2B5EF4-FFF2-40B4-BE49-F238E27FC236}">
-                <a16:creationId xmlns:a16="http://schemas.microsoft.com/office/drawing/2014/main" id="{EE85C323-4018-4E77-8E62-60F0CB50B799}"/>
+                <a16:creationId xmlns:a16="http://schemas.microsoft.com/office/drawing/2014/main" id="{9390303D-036A-4A09-97B9-31455C4A39EB}"/>
               </a:ext>
             </a:extLst>
           </p:cNvPr>
@@ -14225,48 +14331,45 @@
           <a:p>
             <a:r>
               <a:rPr lang="en-US" dirty="0"/>
-              <a:t>Class Activity 01 – AWS Ec2 Instance Basics Workshop</a:t>
+              <a:t>Launch EC2 Instance (Cont’d)</a:t>
             </a:r>
-            <a:br>
-              <a:rPr lang="en-US" dirty="0"/>
-            </a:br>
             <a:endParaRPr lang="en-CA" dirty="0"/>
           </a:p>
         </p:txBody>
       </p:sp>
-      <p:sp>
-        <p:nvSpPr>
-          <p:cNvPr id="3" name="Text Placeholder 2">
+      <p:pic>
+        <p:nvPicPr>
+          <p:cNvPr id="4" name="Content Placeholder 3" descr="A screenshot of a computer&#10;&#10;Description generated with very high confidence">
             <a:extLst>
               <a:ext uri="{FF2B5EF4-FFF2-40B4-BE49-F238E27FC236}">
-                <a16:creationId xmlns:a16="http://schemas.microsoft.com/office/drawing/2014/main" id="{48B221F8-55A8-4568-AD15-0153F5471B2E}"/>
+                <a16:creationId xmlns:a16="http://schemas.microsoft.com/office/drawing/2014/main" id="{8011D9E2-EA91-418B-8BE9-DDD5CB80F3B1}"/>
               </a:ext>
             </a:extLst>
           </p:cNvPr>
-          <p:cNvSpPr>
-            <a:spLocks noGrp="1"/>
-          </p:cNvSpPr>
-          <p:nvPr>
-            <p:ph type="body" idx="1"/>
-          </p:nvPr>
-        </p:nvSpPr>
-        <p:spPr/>
-        <p:txBody>
-          <a:bodyPr/>
-          <a:lstStyle/>
-          <a:p>
-            <a:r>
-              <a:rPr lang="en-US" dirty="0"/>
-              <a:t>Connect to Launched Instance</a:t>
-            </a:r>
-            <a:endParaRPr lang="en-CA" dirty="0"/>
-          </a:p>
-        </p:txBody>
-      </p:sp>
+          <p:cNvPicPr>
+            <a:picLocks noGrp="1" noChangeAspect="1"/>
+          </p:cNvPicPr>
+          <p:nvPr>
+            <p:ph idx="1"/>
+          </p:nvPr>
+        </p:nvPicPr>
+        <p:blipFill>
+          <a:blip r:embed="rId2"/>
+          <a:stretch>
+            <a:fillRect/>
+          </a:stretch>
+        </p:blipFill>
+        <p:spPr>
+          <a:xfrm>
+            <a:off x="2725126" y="2249488"/>
+            <a:ext cx="6738573" cy="3541712"/>
+          </a:xfrm>
+        </p:spPr>
+      </p:pic>
     </p:spTree>
     <p:extLst>
       <p:ext uri="{BB962C8B-B14F-4D97-AF65-F5344CB8AC3E}">
-        <p14:creationId xmlns:p14="http://schemas.microsoft.com/office/powerpoint/2010/main" val="323912494"/>
+        <p14:creationId xmlns:p14="http://schemas.microsoft.com/office/powerpoint/2010/main" val="3755271365"/>
       </p:ext>
     </p:extLst>
   </p:cSld>
@@ -14295,10 +14398,10 @@
       </p:grpSpPr>
       <p:sp>
         <p:nvSpPr>
-          <p:cNvPr id="5" name="Title 4">
+          <p:cNvPr id="2" name="Title 1">
             <a:extLst>
               <a:ext uri="{FF2B5EF4-FFF2-40B4-BE49-F238E27FC236}">
-                <a16:creationId xmlns:a16="http://schemas.microsoft.com/office/drawing/2014/main" id="{9390303D-036A-4A09-97B9-31455C4A39EB}"/>
+                <a16:creationId xmlns:a16="http://schemas.microsoft.com/office/drawing/2014/main" id="{EE85C323-4018-4E77-8E62-60F0CB50B799}"/>
               </a:ext>
             </a:extLst>
           </p:cNvPr>
@@ -14316,45 +14419,48 @@
           <a:p>
             <a:r>
               <a:rPr lang="en-US" dirty="0"/>
+              <a:t>Class Activity 01 – AWS Ec2 Instance Basics Workshop</a:t>
+            </a:r>
+            <a:br>
+              <a:rPr lang="en-US" dirty="0"/>
+            </a:br>
+            <a:endParaRPr lang="en-CA" dirty="0"/>
+          </a:p>
+        </p:txBody>
+      </p:sp>
+      <p:sp>
+        <p:nvSpPr>
+          <p:cNvPr id="3" name="Text Placeholder 2">
+            <a:extLst>
+              <a:ext uri="{FF2B5EF4-FFF2-40B4-BE49-F238E27FC236}">
+                <a16:creationId xmlns:a16="http://schemas.microsoft.com/office/drawing/2014/main" id="{48B221F8-55A8-4568-AD15-0153F5471B2E}"/>
+              </a:ext>
+            </a:extLst>
+          </p:cNvPr>
+          <p:cNvSpPr>
+            <a:spLocks noGrp="1"/>
+          </p:cNvSpPr>
+          <p:nvPr>
+            <p:ph type="body" idx="1"/>
+          </p:nvPr>
+        </p:nvSpPr>
+        <p:spPr/>
+        <p:txBody>
+          <a:bodyPr/>
+          <a:lstStyle/>
+          <a:p>
+            <a:r>
+              <a:rPr lang="en-US" dirty="0"/>
               <a:t>Connect to Launched Instance</a:t>
             </a:r>
             <a:endParaRPr lang="en-CA" dirty="0"/>
           </a:p>
         </p:txBody>
       </p:sp>
-      <p:pic>
-        <p:nvPicPr>
-          <p:cNvPr id="4" name="Content Placeholder 3" descr="A screenshot of a computer&#10;&#10;Description generated with very high confidence">
-            <a:extLst>
-              <a:ext uri="{FF2B5EF4-FFF2-40B4-BE49-F238E27FC236}">
-                <a16:creationId xmlns:a16="http://schemas.microsoft.com/office/drawing/2014/main" id="{4D7CAD59-523D-4050-9362-00B73CFAC7E8}"/>
-              </a:ext>
-            </a:extLst>
-          </p:cNvPr>
-          <p:cNvPicPr>
-            <a:picLocks noGrp="1" noChangeAspect="1"/>
-          </p:cNvPicPr>
-          <p:nvPr>
-            <p:ph idx="1"/>
-          </p:nvPr>
-        </p:nvPicPr>
-        <p:blipFill>
-          <a:blip r:embed="rId2"/>
-          <a:stretch>
-            <a:fillRect/>
-          </a:stretch>
-        </p:blipFill>
-        <p:spPr>
-          <a:xfrm>
-            <a:off x="2725126" y="2249488"/>
-            <a:ext cx="6738573" cy="3541712"/>
-          </a:xfrm>
-        </p:spPr>
-      </p:pic>
     </p:spTree>
     <p:extLst>
       <p:ext uri="{BB962C8B-B14F-4D97-AF65-F5344CB8AC3E}">
-        <p14:creationId xmlns:p14="http://schemas.microsoft.com/office/powerpoint/2010/main" val="1615406285"/>
+        <p14:creationId xmlns:p14="http://schemas.microsoft.com/office/powerpoint/2010/main" val="323912494"/>
       </p:ext>
     </p:extLst>
   </p:cSld>
@@ -14404,7 +14510,7 @@
           <a:p>
             <a:r>
               <a:rPr lang="en-US" dirty="0"/>
-              <a:t>Connect to Launched Instance (Cont’d)</a:t>
+              <a:t>Connect to Launched Instance</a:t>
             </a:r>
             <a:endParaRPr lang="en-CA" dirty="0"/>
           </a:p>
@@ -14415,7 +14521,7 @@
           <p:cNvPr id="4" name="Content Placeholder 3" descr="A screenshot of a computer&#10;&#10;Description generated with very high confidence">
             <a:extLst>
               <a:ext uri="{FF2B5EF4-FFF2-40B4-BE49-F238E27FC236}">
-                <a16:creationId xmlns:a16="http://schemas.microsoft.com/office/drawing/2014/main" id="{20C5F5FF-4BA9-4982-9BF8-CA30BC9857BA}"/>
+                <a16:creationId xmlns:a16="http://schemas.microsoft.com/office/drawing/2014/main" id="{4D7CAD59-523D-4050-9362-00B73CFAC7E8}"/>
               </a:ext>
             </a:extLst>
           </p:cNvPr>
@@ -14442,7 +14548,7 @@
     </p:spTree>
     <p:extLst>
       <p:ext uri="{BB962C8B-B14F-4D97-AF65-F5344CB8AC3E}">
-        <p14:creationId xmlns:p14="http://schemas.microsoft.com/office/powerpoint/2010/main" val="107794420"/>
+        <p14:creationId xmlns:p14="http://schemas.microsoft.com/office/powerpoint/2010/main" val="1615406285"/>
       </p:ext>
     </p:extLst>
   </p:cSld>
@@ -14500,10 +14606,10 @@
       </p:sp>
       <p:pic>
         <p:nvPicPr>
-          <p:cNvPr id="4" name="Content Placeholder 3" descr="A screenshot of a cell phone&#10;&#10;Description generated with very high confidence">
+          <p:cNvPr id="4" name="Content Placeholder 3" descr="A screenshot of a computer&#10;&#10;Description generated with very high confidence">
             <a:extLst>
               <a:ext uri="{FF2B5EF4-FFF2-40B4-BE49-F238E27FC236}">
-                <a16:creationId xmlns:a16="http://schemas.microsoft.com/office/drawing/2014/main" id="{C1EF4692-4D23-4B06-B777-D7894C733FE2}"/>
+                <a16:creationId xmlns:a16="http://schemas.microsoft.com/office/drawing/2014/main" id="{20C5F5FF-4BA9-4982-9BF8-CA30BC9857BA}"/>
               </a:ext>
             </a:extLst>
           </p:cNvPr>
@@ -14522,15 +14628,15 @@
         </p:blipFill>
         <p:spPr>
           <a:xfrm>
-            <a:off x="3191371" y="2249488"/>
-            <a:ext cx="5806084" cy="3541712"/>
+            <a:off x="2725126" y="2249488"/>
+            <a:ext cx="6738573" cy="3541712"/>
           </a:xfrm>
         </p:spPr>
       </p:pic>
     </p:spTree>
     <p:extLst>
       <p:ext uri="{BB962C8B-B14F-4D97-AF65-F5344CB8AC3E}">
-        <p14:creationId xmlns:p14="http://schemas.microsoft.com/office/powerpoint/2010/main" val="2377285272"/>
+        <p14:creationId xmlns:p14="http://schemas.microsoft.com/office/powerpoint/2010/main" val="107794420"/>
       </p:ext>
     </p:extLst>
   </p:cSld>
@@ -14591,7 +14697,7 @@
           <p:cNvPr id="4" name="Content Placeholder 3" descr="A screenshot of a cell phone&#10;&#10;Description generated with very high confidence">
             <a:extLst>
               <a:ext uri="{FF2B5EF4-FFF2-40B4-BE49-F238E27FC236}">
-                <a16:creationId xmlns:a16="http://schemas.microsoft.com/office/drawing/2014/main" id="{02896C39-9776-423C-8E9C-15A2E474E383}"/>
+                <a16:creationId xmlns:a16="http://schemas.microsoft.com/office/drawing/2014/main" id="{C1EF4692-4D23-4B06-B777-D7894C733FE2}"/>
               </a:ext>
             </a:extLst>
           </p:cNvPr>
@@ -14610,15 +14716,15 @@
         </p:blipFill>
         <p:spPr>
           <a:xfrm>
-            <a:off x="3504254" y="2249488"/>
-            <a:ext cx="5180317" cy="3541712"/>
+            <a:off x="3191371" y="2249488"/>
+            <a:ext cx="5806084" cy="3541712"/>
           </a:xfrm>
         </p:spPr>
       </p:pic>
     </p:spTree>
     <p:extLst>
       <p:ext uri="{BB962C8B-B14F-4D97-AF65-F5344CB8AC3E}">
-        <p14:creationId xmlns:p14="http://schemas.microsoft.com/office/powerpoint/2010/main" val="517791417"/>
+        <p14:creationId xmlns:p14="http://schemas.microsoft.com/office/powerpoint/2010/main" val="2377285272"/>
       </p:ext>
     </p:extLst>
   </p:cSld>
@@ -14679,7 +14785,7 @@
           <p:cNvPr id="4" name="Content Placeholder 3" descr="A screenshot of a cell phone&#10;&#10;Description generated with very high confidence">
             <a:extLst>
               <a:ext uri="{FF2B5EF4-FFF2-40B4-BE49-F238E27FC236}">
-                <a16:creationId xmlns:a16="http://schemas.microsoft.com/office/drawing/2014/main" id="{B5FA17BE-C671-439A-BE85-20ADB502B3D5}"/>
+                <a16:creationId xmlns:a16="http://schemas.microsoft.com/office/drawing/2014/main" id="{02896C39-9776-423C-8E9C-15A2E474E383}"/>
               </a:ext>
             </a:extLst>
           </p:cNvPr>
@@ -14698,15 +14804,15 @@
         </p:blipFill>
         <p:spPr>
           <a:xfrm>
-            <a:off x="3242697" y="2249488"/>
-            <a:ext cx="5703432" cy="3541712"/>
+            <a:off x="3504254" y="2249488"/>
+            <a:ext cx="5180317" cy="3541712"/>
           </a:xfrm>
         </p:spPr>
       </p:pic>
     </p:spTree>
     <p:extLst>
       <p:ext uri="{BB962C8B-B14F-4D97-AF65-F5344CB8AC3E}">
-        <p14:creationId xmlns:p14="http://schemas.microsoft.com/office/powerpoint/2010/main" val="880833895"/>
+        <p14:creationId xmlns:p14="http://schemas.microsoft.com/office/powerpoint/2010/main" val="517791417"/>
       </p:ext>
     </p:extLst>
   </p:cSld>
@@ -14767,7 +14873,7 @@
           <p:cNvPr id="4" name="Content Placeholder 3" descr="A screenshot of a cell phone&#10;&#10;Description generated with very high confidence">
             <a:extLst>
               <a:ext uri="{FF2B5EF4-FFF2-40B4-BE49-F238E27FC236}">
-                <a16:creationId xmlns:a16="http://schemas.microsoft.com/office/drawing/2014/main" id="{F4539F5C-2B25-4835-8B8F-FA09F59AEE35}"/>
+                <a16:creationId xmlns:a16="http://schemas.microsoft.com/office/drawing/2014/main" id="{B5FA17BE-C671-439A-BE85-20ADB502B3D5}"/>
               </a:ext>
             </a:extLst>
           </p:cNvPr>
@@ -14786,15 +14892,15 @@
         </p:blipFill>
         <p:spPr>
           <a:xfrm>
-            <a:off x="3171483" y="2249488"/>
-            <a:ext cx="5845860" cy="3541712"/>
+            <a:off x="3242697" y="2249488"/>
+            <a:ext cx="5703432" cy="3541712"/>
           </a:xfrm>
         </p:spPr>
       </p:pic>
     </p:spTree>
     <p:extLst>
       <p:ext uri="{BB962C8B-B14F-4D97-AF65-F5344CB8AC3E}">
-        <p14:creationId xmlns:p14="http://schemas.microsoft.com/office/powerpoint/2010/main" val="2261114936"/>
+        <p14:creationId xmlns:p14="http://schemas.microsoft.com/office/powerpoint/2010/main" val="880833895"/>
       </p:ext>
     </p:extLst>
   </p:cSld>
@@ -14855,7 +14961,7 @@
           <p:cNvPr id="4" name="Content Placeholder 3" descr="A screenshot of a cell phone&#10;&#10;Description generated with very high confidence">
             <a:extLst>
               <a:ext uri="{FF2B5EF4-FFF2-40B4-BE49-F238E27FC236}">
-                <a16:creationId xmlns:a16="http://schemas.microsoft.com/office/drawing/2014/main" id="{CFA56931-66A0-4656-8B86-6235EC8EE57F}"/>
+                <a16:creationId xmlns:a16="http://schemas.microsoft.com/office/drawing/2014/main" id="{F4539F5C-2B25-4835-8B8F-FA09F59AEE35}"/>
               </a:ext>
             </a:extLst>
           </p:cNvPr>
@@ -14874,15 +14980,15 @@
         </p:blipFill>
         <p:spPr>
           <a:xfrm>
-            <a:off x="3512094" y="2652954"/>
-            <a:ext cx="5164638" cy="2734780"/>
+            <a:off x="3171483" y="2249488"/>
+            <a:ext cx="5845860" cy="3541712"/>
           </a:xfrm>
         </p:spPr>
       </p:pic>
     </p:spTree>
     <p:extLst>
       <p:ext uri="{BB962C8B-B14F-4D97-AF65-F5344CB8AC3E}">
-        <p14:creationId xmlns:p14="http://schemas.microsoft.com/office/powerpoint/2010/main" val="614773890"/>
+        <p14:creationId xmlns:p14="http://schemas.microsoft.com/office/powerpoint/2010/main" val="2261114936"/>
       </p:ext>
     </p:extLst>
   </p:cSld>
@@ -14914,7 +15020,7 @@
           <p:cNvPr id="2" name="Title 1">
             <a:extLst>
               <a:ext uri="{FF2B5EF4-FFF2-40B4-BE49-F238E27FC236}">
-                <a16:creationId xmlns:a16="http://schemas.microsoft.com/office/drawing/2014/main" id="{5D69F76F-8D5A-406B-82DF-21E0E7FAF5AB}"/>
+                <a16:creationId xmlns:a16="http://schemas.microsoft.com/office/drawing/2014/main" id="{EE85C323-4018-4E77-8E62-60F0CB50B799}"/>
               </a:ext>
             </a:extLst>
           </p:cNvPr>
@@ -14932,18 +15038,21 @@
           <a:p>
             <a:r>
               <a:rPr lang="en-US" dirty="0"/>
-              <a:t>Creating Amazon Ec2 Key Pairs</a:t>
+              <a:t>Class Activity 01 – AWS Ec2 Instance Basics Workshop</a:t>
             </a:r>
+            <a:br>
+              <a:rPr lang="en-US" dirty="0"/>
+            </a:br>
             <a:endParaRPr lang="en-CA" dirty="0"/>
           </a:p>
         </p:txBody>
       </p:sp>
       <p:sp>
         <p:nvSpPr>
-          <p:cNvPr id="3" name="Content Placeholder 2">
+          <p:cNvPr id="3" name="Text Placeholder 2">
             <a:extLst>
               <a:ext uri="{FF2B5EF4-FFF2-40B4-BE49-F238E27FC236}">
-                <a16:creationId xmlns:a16="http://schemas.microsoft.com/office/drawing/2014/main" id="{F5AD99BD-CCE6-472C-B104-018ABC5582D6}"/>
+                <a16:creationId xmlns:a16="http://schemas.microsoft.com/office/drawing/2014/main" id="{48B221F8-55A8-4568-AD15-0153F5471B2E}"/>
               </a:ext>
             </a:extLst>
           </p:cNvPr>
@@ -14951,7 +15060,7 @@
             <a:spLocks noGrp="1"/>
           </p:cNvSpPr>
           <p:nvPr>
-            <p:ph idx="1"/>
+            <p:ph type="body" idx="1"/>
           </p:nvPr>
         </p:nvSpPr>
         <p:spPr/>
@@ -14961,59 +15070,16 @@
           <a:p>
             <a:r>
               <a:rPr lang="en-US" dirty="0"/>
-              <a:t>Login to AWS</a:t>
+              <a:t>Creating Amazon Ec2 Key Pairs</a:t>
             </a:r>
             <a:endParaRPr lang="en-CA" dirty="0"/>
           </a:p>
-          <a:p>
-            <a:r>
-              <a:rPr lang="en-US" dirty="0"/>
-              <a:t>S</a:t>
-            </a:r>
-            <a:r>
-              <a:rPr lang="en-CA" dirty="0"/>
-              <a:t>elect EC2 Service:</a:t>
-            </a:r>
-          </a:p>
-          <a:p>
-            <a:endParaRPr lang="en-US" dirty="0"/>
-          </a:p>
         </p:txBody>
       </p:sp>
-      <p:pic>
-        <p:nvPicPr>
-          <p:cNvPr id="5" name="Picture 4">
-            <a:extLst>
-              <a:ext uri="{FF2B5EF4-FFF2-40B4-BE49-F238E27FC236}">
-                <a16:creationId xmlns:a16="http://schemas.microsoft.com/office/drawing/2014/main" id="{D200F13F-4D20-41A2-B2B5-C6BCEFD5676B}"/>
-              </a:ext>
-            </a:extLst>
-          </p:cNvPr>
-          <p:cNvPicPr>
-            <a:picLocks noChangeAspect="1"/>
-          </p:cNvPicPr>
-          <p:nvPr/>
-        </p:nvPicPr>
-        <p:blipFill>
-          <a:blip r:embed="rId3"/>
-          <a:stretch>
-            <a:fillRect/>
-          </a:stretch>
-        </p:blipFill>
-        <p:spPr>
-          <a:xfrm>
-            <a:off x="3969327" y="2118374"/>
-            <a:ext cx="7908817" cy="3991481"/>
-          </a:xfrm>
-          <a:prstGeom prst="rect">
-            <a:avLst/>
-          </a:prstGeom>
-        </p:spPr>
-      </p:pic>
     </p:spTree>
     <p:extLst>
       <p:ext uri="{BB962C8B-B14F-4D97-AF65-F5344CB8AC3E}">
-        <p14:creationId xmlns:p14="http://schemas.microsoft.com/office/powerpoint/2010/main" val="87121723"/>
+        <p14:creationId xmlns:p14="http://schemas.microsoft.com/office/powerpoint/2010/main" val="2137269704"/>
       </p:ext>
     </p:extLst>
   </p:cSld>
@@ -15071,10 +15137,10 @@
       </p:sp>
       <p:pic>
         <p:nvPicPr>
-          <p:cNvPr id="4" name="Content Placeholder 3" descr="A screenshot of a social media post&#10;&#10;Description generated with very high confidence">
+          <p:cNvPr id="4" name="Content Placeholder 3" descr="A screenshot of a cell phone&#10;&#10;Description generated with very high confidence">
             <a:extLst>
               <a:ext uri="{FF2B5EF4-FFF2-40B4-BE49-F238E27FC236}">
-                <a16:creationId xmlns:a16="http://schemas.microsoft.com/office/drawing/2014/main" id="{78E87735-AADF-46E0-B189-720F5804B91F}"/>
+                <a16:creationId xmlns:a16="http://schemas.microsoft.com/office/drawing/2014/main" id="{CFA56931-66A0-4656-8B86-6235EC8EE57F}"/>
               </a:ext>
             </a:extLst>
           </p:cNvPr>
@@ -15093,15 +15159,15 @@
         </p:blipFill>
         <p:spPr>
           <a:xfrm>
-            <a:off x="1707889" y="2249488"/>
-            <a:ext cx="8773048" cy="3541712"/>
+            <a:off x="3512094" y="2652954"/>
+            <a:ext cx="5164638" cy="2734780"/>
           </a:xfrm>
         </p:spPr>
       </p:pic>
     </p:spTree>
     <p:extLst>
       <p:ext uri="{BB962C8B-B14F-4D97-AF65-F5344CB8AC3E}">
-        <p14:creationId xmlns:p14="http://schemas.microsoft.com/office/powerpoint/2010/main" val="2185522405"/>
+        <p14:creationId xmlns:p14="http://schemas.microsoft.com/office/powerpoint/2010/main" val="614773890"/>
       </p:ext>
     </p:extLst>
   </p:cSld>
@@ -15159,6 +15225,94 @@
       </p:sp>
       <p:pic>
         <p:nvPicPr>
+          <p:cNvPr id="4" name="Content Placeholder 3" descr="A screenshot of a social media post&#10;&#10;Description generated with very high confidence">
+            <a:extLst>
+              <a:ext uri="{FF2B5EF4-FFF2-40B4-BE49-F238E27FC236}">
+                <a16:creationId xmlns:a16="http://schemas.microsoft.com/office/drawing/2014/main" id="{78E87735-AADF-46E0-B189-720F5804B91F}"/>
+              </a:ext>
+            </a:extLst>
+          </p:cNvPr>
+          <p:cNvPicPr>
+            <a:picLocks noGrp="1" noChangeAspect="1"/>
+          </p:cNvPicPr>
+          <p:nvPr>
+            <p:ph idx="1"/>
+          </p:nvPr>
+        </p:nvPicPr>
+        <p:blipFill>
+          <a:blip r:embed="rId2"/>
+          <a:stretch>
+            <a:fillRect/>
+          </a:stretch>
+        </p:blipFill>
+        <p:spPr>
+          <a:xfrm>
+            <a:off x="1707889" y="2249488"/>
+            <a:ext cx="8773048" cy="3541712"/>
+          </a:xfrm>
+        </p:spPr>
+      </p:pic>
+    </p:spTree>
+    <p:extLst>
+      <p:ext uri="{BB962C8B-B14F-4D97-AF65-F5344CB8AC3E}">
+        <p14:creationId xmlns:p14="http://schemas.microsoft.com/office/powerpoint/2010/main" val="2185522405"/>
+      </p:ext>
+    </p:extLst>
+  </p:cSld>
+  <p:clrMapOvr>
+    <a:masterClrMapping/>
+  </p:clrMapOvr>
+</p:sld>
+</file>
+
+<file path=ppt/slides/slide32.xml><?xml version="1.0" encoding="utf-8"?>
+<p:sld xmlns:a="http://schemas.openxmlformats.org/drawingml/2006/main" xmlns:r="http://schemas.openxmlformats.org/officeDocument/2006/relationships" xmlns:p="http://schemas.openxmlformats.org/presentationml/2006/main">
+  <p:cSld>
+    <p:spTree>
+      <p:nvGrpSpPr>
+        <p:cNvPr id="1" name=""/>
+        <p:cNvGrpSpPr/>
+        <p:nvPr/>
+      </p:nvGrpSpPr>
+      <p:grpSpPr>
+        <a:xfrm>
+          <a:off x="0" y="0"/>
+          <a:ext cx="0" cy="0"/>
+          <a:chOff x="0" y="0"/>
+          <a:chExt cx="0" cy="0"/>
+        </a:xfrm>
+      </p:grpSpPr>
+      <p:sp>
+        <p:nvSpPr>
+          <p:cNvPr id="5" name="Title 4">
+            <a:extLst>
+              <a:ext uri="{FF2B5EF4-FFF2-40B4-BE49-F238E27FC236}">
+                <a16:creationId xmlns:a16="http://schemas.microsoft.com/office/drawing/2014/main" id="{9390303D-036A-4A09-97B9-31455C4A39EB}"/>
+              </a:ext>
+            </a:extLst>
+          </p:cNvPr>
+          <p:cNvSpPr>
+            <a:spLocks noGrp="1"/>
+          </p:cNvSpPr>
+          <p:nvPr>
+            <p:ph type="title"/>
+          </p:nvPr>
+        </p:nvSpPr>
+        <p:spPr/>
+        <p:txBody>
+          <a:bodyPr/>
+          <a:lstStyle/>
+          <a:p>
+            <a:r>
+              <a:rPr lang="en-US" dirty="0"/>
+              <a:t>Connect to Launched Instance (Cont’d)</a:t>
+            </a:r>
+            <a:endParaRPr lang="en-CA" dirty="0"/>
+          </a:p>
+        </p:txBody>
+      </p:sp>
+      <p:pic>
+        <p:nvPicPr>
           <p:cNvPr id="4" name="Content Placeholder 3" descr="A screenshot of a cell phone&#10;&#10;Description generated with very high confidence">
             <a:extLst>
               <a:ext uri="{FF2B5EF4-FFF2-40B4-BE49-F238E27FC236}">
@@ -15199,7 +15353,7 @@
 </p:sld>
 </file>
 
-<file path=ppt/slides/slide32.xml><?xml version="1.0" encoding="utf-8"?>
+<file path=ppt/slides/slide33.xml><?xml version="1.0" encoding="utf-8"?>
 <p:sld xmlns:a="http://schemas.openxmlformats.org/drawingml/2006/main" xmlns:r="http://schemas.openxmlformats.org/officeDocument/2006/relationships" xmlns:p="http://schemas.openxmlformats.org/presentationml/2006/main">
   <p:cSld>
     <p:spTree>
@@ -15309,6 +15463,137 @@
           <p:cNvPr id="2" name="Title 1">
             <a:extLst>
               <a:ext uri="{FF2B5EF4-FFF2-40B4-BE49-F238E27FC236}">
+                <a16:creationId xmlns:a16="http://schemas.microsoft.com/office/drawing/2014/main" id="{5D69F76F-8D5A-406B-82DF-21E0E7FAF5AB}"/>
+              </a:ext>
+            </a:extLst>
+          </p:cNvPr>
+          <p:cNvSpPr>
+            <a:spLocks noGrp="1"/>
+          </p:cNvSpPr>
+          <p:nvPr>
+            <p:ph type="title"/>
+          </p:nvPr>
+        </p:nvSpPr>
+        <p:spPr/>
+        <p:txBody>
+          <a:bodyPr/>
+          <a:lstStyle/>
+          <a:p>
+            <a:r>
+              <a:rPr lang="en-US" dirty="0"/>
+              <a:t>Creating Amazon Ec2 Key Pairs</a:t>
+            </a:r>
+            <a:endParaRPr lang="en-CA" dirty="0"/>
+          </a:p>
+        </p:txBody>
+      </p:sp>
+      <p:sp>
+        <p:nvSpPr>
+          <p:cNvPr id="3" name="Content Placeholder 2">
+            <a:extLst>
+              <a:ext uri="{FF2B5EF4-FFF2-40B4-BE49-F238E27FC236}">
+                <a16:creationId xmlns:a16="http://schemas.microsoft.com/office/drawing/2014/main" id="{F5AD99BD-CCE6-472C-B104-018ABC5582D6}"/>
+              </a:ext>
+            </a:extLst>
+          </p:cNvPr>
+          <p:cNvSpPr>
+            <a:spLocks noGrp="1"/>
+          </p:cNvSpPr>
+          <p:nvPr>
+            <p:ph idx="1"/>
+          </p:nvPr>
+        </p:nvSpPr>
+        <p:spPr/>
+        <p:txBody>
+          <a:bodyPr/>
+          <a:lstStyle/>
+          <a:p>
+            <a:r>
+              <a:rPr lang="en-US" dirty="0"/>
+              <a:t>Login to AWS</a:t>
+            </a:r>
+            <a:endParaRPr lang="en-CA" dirty="0"/>
+          </a:p>
+          <a:p>
+            <a:r>
+              <a:rPr lang="en-US" dirty="0"/>
+              <a:t>S</a:t>
+            </a:r>
+            <a:r>
+              <a:rPr lang="en-CA" dirty="0"/>
+              <a:t>elect EC2 Service:</a:t>
+            </a:r>
+          </a:p>
+          <a:p>
+            <a:endParaRPr lang="en-US" dirty="0"/>
+          </a:p>
+        </p:txBody>
+      </p:sp>
+      <p:pic>
+        <p:nvPicPr>
+          <p:cNvPr id="5" name="Picture 4">
+            <a:extLst>
+              <a:ext uri="{FF2B5EF4-FFF2-40B4-BE49-F238E27FC236}">
+                <a16:creationId xmlns:a16="http://schemas.microsoft.com/office/drawing/2014/main" id="{D200F13F-4D20-41A2-B2B5-C6BCEFD5676B}"/>
+              </a:ext>
+            </a:extLst>
+          </p:cNvPr>
+          <p:cNvPicPr>
+            <a:picLocks noChangeAspect="1"/>
+          </p:cNvPicPr>
+          <p:nvPr/>
+        </p:nvPicPr>
+        <p:blipFill>
+          <a:blip r:embed="rId3"/>
+          <a:stretch>
+            <a:fillRect/>
+          </a:stretch>
+        </p:blipFill>
+        <p:spPr>
+          <a:xfrm>
+            <a:off x="3969327" y="2118374"/>
+            <a:ext cx="7908817" cy="3991481"/>
+          </a:xfrm>
+          <a:prstGeom prst="rect">
+            <a:avLst/>
+          </a:prstGeom>
+        </p:spPr>
+      </p:pic>
+    </p:spTree>
+    <p:extLst>
+      <p:ext uri="{BB962C8B-B14F-4D97-AF65-F5344CB8AC3E}">
+        <p14:creationId xmlns:p14="http://schemas.microsoft.com/office/powerpoint/2010/main" val="87121723"/>
+      </p:ext>
+    </p:extLst>
+  </p:cSld>
+  <p:clrMapOvr>
+    <a:masterClrMapping/>
+  </p:clrMapOvr>
+</p:sld>
+</file>
+
+<file path=ppt/slides/slide5.xml><?xml version="1.0" encoding="utf-8"?>
+<p:sld xmlns:a="http://schemas.openxmlformats.org/drawingml/2006/main" xmlns:r="http://schemas.openxmlformats.org/officeDocument/2006/relationships" xmlns:p="http://schemas.openxmlformats.org/presentationml/2006/main">
+  <p:cSld>
+    <p:spTree>
+      <p:nvGrpSpPr>
+        <p:cNvPr id="1" name=""/>
+        <p:cNvGrpSpPr/>
+        <p:nvPr/>
+      </p:nvGrpSpPr>
+      <p:grpSpPr>
+        <a:xfrm>
+          <a:off x="0" y="0"/>
+          <a:ext cx="0" cy="0"/>
+          <a:chOff x="0" y="0"/>
+          <a:chExt cx="0" cy="0"/>
+        </a:xfrm>
+      </p:grpSpPr>
+      <p:sp>
+        <p:nvSpPr>
+          <p:cNvPr id="2" name="Title 1">
+            <a:extLst>
+              <a:ext uri="{FF2B5EF4-FFF2-40B4-BE49-F238E27FC236}">
                 <a16:creationId xmlns:a16="http://schemas.microsoft.com/office/drawing/2014/main" id="{A62F53AD-7C09-4D3A-AAE0-7DB0E5B3A724}"/>
               </a:ext>
             </a:extLst>
@@ -15401,94 +15686,6 @@
     <p:extLst>
       <p:ext uri="{BB962C8B-B14F-4D97-AF65-F5344CB8AC3E}">
         <p14:creationId xmlns:p14="http://schemas.microsoft.com/office/powerpoint/2010/main" val="3291283730"/>
-      </p:ext>
-    </p:extLst>
-  </p:cSld>
-  <p:clrMapOvr>
-    <a:masterClrMapping/>
-  </p:clrMapOvr>
-</p:sld>
-</file>
-
-<file path=ppt/slides/slide5.xml><?xml version="1.0" encoding="utf-8"?>
-<p:sld xmlns:a="http://schemas.openxmlformats.org/drawingml/2006/main" xmlns:r="http://schemas.openxmlformats.org/officeDocument/2006/relationships" xmlns:p="http://schemas.openxmlformats.org/presentationml/2006/main">
-  <p:cSld>
-    <p:spTree>
-      <p:nvGrpSpPr>
-        <p:cNvPr id="1" name=""/>
-        <p:cNvGrpSpPr/>
-        <p:nvPr/>
-      </p:nvGrpSpPr>
-      <p:grpSpPr>
-        <a:xfrm>
-          <a:off x="0" y="0"/>
-          <a:ext cx="0" cy="0"/>
-          <a:chOff x="0" y="0"/>
-          <a:chExt cx="0" cy="0"/>
-        </a:xfrm>
-      </p:grpSpPr>
-      <p:sp>
-        <p:nvSpPr>
-          <p:cNvPr id="5" name="Title 4">
-            <a:extLst>
-              <a:ext uri="{FF2B5EF4-FFF2-40B4-BE49-F238E27FC236}">
-                <a16:creationId xmlns:a16="http://schemas.microsoft.com/office/drawing/2014/main" id="{9390303D-036A-4A09-97B9-31455C4A39EB}"/>
-              </a:ext>
-            </a:extLst>
-          </p:cNvPr>
-          <p:cNvSpPr>
-            <a:spLocks noGrp="1"/>
-          </p:cNvSpPr>
-          <p:nvPr>
-            <p:ph type="title"/>
-          </p:nvPr>
-        </p:nvSpPr>
-        <p:spPr/>
-        <p:txBody>
-          <a:bodyPr/>
-          <a:lstStyle/>
-          <a:p>
-            <a:r>
-              <a:rPr lang="en-US" dirty="0"/>
-              <a:t>Creating Amazon Ec2 Key Pairs (Cont’d)</a:t>
-            </a:r>
-            <a:endParaRPr lang="en-CA" dirty="0"/>
-          </a:p>
-        </p:txBody>
-      </p:sp>
-      <p:pic>
-        <p:nvPicPr>
-          <p:cNvPr id="9" name="Content Placeholder 8" descr="A screenshot of a social media post&#10;&#10;Description generated with very high confidence">
-            <a:extLst>
-              <a:ext uri="{FF2B5EF4-FFF2-40B4-BE49-F238E27FC236}">
-                <a16:creationId xmlns:a16="http://schemas.microsoft.com/office/drawing/2014/main" id="{0DA0EA64-2C3A-451C-8D3C-03E26F55770F}"/>
-              </a:ext>
-            </a:extLst>
-          </p:cNvPr>
-          <p:cNvPicPr>
-            <a:picLocks noGrp="1" noChangeAspect="1"/>
-          </p:cNvPicPr>
-          <p:nvPr>
-            <p:ph idx="1"/>
-          </p:nvPr>
-        </p:nvPicPr>
-        <p:blipFill>
-          <a:blip r:embed="rId2"/>
-          <a:stretch>
-            <a:fillRect/>
-          </a:stretch>
-        </p:blipFill>
-        <p:spPr>
-          <a:xfrm>
-            <a:off x="1893865" y="1686560"/>
-            <a:ext cx="8401093" cy="4588192"/>
-          </a:xfrm>
-        </p:spPr>
-      </p:pic>
-    </p:spTree>
-    <p:extLst>
-      <p:ext uri="{BB962C8B-B14F-4D97-AF65-F5344CB8AC3E}">
-        <p14:creationId xmlns:p14="http://schemas.microsoft.com/office/powerpoint/2010/main" val="2933906019"/>
       </p:ext>
     </p:extLst>
   </p:cSld>
@@ -15546,10 +15743,10 @@
       </p:sp>
       <p:pic>
         <p:nvPicPr>
-          <p:cNvPr id="6" name="Content Placeholder 5" descr="A screenshot of a computer&#10;&#10;Description generated with very high confidence">
+          <p:cNvPr id="9" name="Content Placeholder 8" descr="A screenshot of a social media post&#10;&#10;Description generated with very high confidence">
             <a:extLst>
               <a:ext uri="{FF2B5EF4-FFF2-40B4-BE49-F238E27FC236}">
-                <a16:creationId xmlns:a16="http://schemas.microsoft.com/office/drawing/2014/main" id="{FC09FC3F-3FC6-44E2-A8E4-FEABDFE9A004}"/>
+                <a16:creationId xmlns:a16="http://schemas.microsoft.com/office/drawing/2014/main" id="{0DA0EA64-2C3A-451C-8D3C-03E26F55770F}"/>
               </a:ext>
             </a:extLst>
           </p:cNvPr>
@@ -15568,15 +15765,15 @@
         </p:blipFill>
         <p:spPr>
           <a:xfrm>
-            <a:off x="2044279" y="1813850"/>
-            <a:ext cx="8103441" cy="4425632"/>
+            <a:off x="1893865" y="1686560"/>
+            <a:ext cx="8401093" cy="4588192"/>
           </a:xfrm>
         </p:spPr>
       </p:pic>
     </p:spTree>
     <p:extLst>
       <p:ext uri="{BB962C8B-B14F-4D97-AF65-F5344CB8AC3E}">
-        <p14:creationId xmlns:p14="http://schemas.microsoft.com/office/powerpoint/2010/main" val="3560187545"/>
+        <p14:creationId xmlns:p14="http://schemas.microsoft.com/office/powerpoint/2010/main" val="2933906019"/>
       </p:ext>
     </p:extLst>
   </p:cSld>
@@ -15634,10 +15831,10 @@
       </p:sp>
       <p:pic>
         <p:nvPicPr>
-          <p:cNvPr id="4" name="Content Placeholder 3" descr="A screenshot of a computer&#10;&#10;Description generated with very high confidence">
+          <p:cNvPr id="6" name="Content Placeholder 5" descr="A screenshot of a computer&#10;&#10;Description generated with very high confidence">
             <a:extLst>
               <a:ext uri="{FF2B5EF4-FFF2-40B4-BE49-F238E27FC236}">
-                <a16:creationId xmlns:a16="http://schemas.microsoft.com/office/drawing/2014/main" id="{94895701-F223-4B3B-B014-95572B06AAEB}"/>
+                <a16:creationId xmlns:a16="http://schemas.microsoft.com/office/drawing/2014/main" id="{FC09FC3F-3FC6-44E2-A8E4-FEABDFE9A004}"/>
               </a:ext>
             </a:extLst>
           </p:cNvPr>
@@ -15645,64 +15842,26 @@
             <a:picLocks noGrp="1" noChangeAspect="1"/>
           </p:cNvPicPr>
           <p:nvPr>
-            <p:ph sz="half" idx="1"/>
+            <p:ph idx="1"/>
           </p:nvPr>
         </p:nvPicPr>
         <p:blipFill>
-          <a:blip r:embed="rId3"/>
+          <a:blip r:embed="rId2"/>
           <a:stretch>
             <a:fillRect/>
           </a:stretch>
         </p:blipFill>
         <p:spPr>
           <a:xfrm>
-            <a:off x="1141413" y="2460373"/>
-            <a:ext cx="4878387" cy="3119941"/>
+            <a:off x="2044279" y="1813850"/>
+            <a:ext cx="8103441" cy="4425632"/>
           </a:xfrm>
         </p:spPr>
       </p:pic>
-      <p:sp>
-        <p:nvSpPr>
-          <p:cNvPr id="6" name="Content Placeholder 5">
-            <a:extLst>
-              <a:ext uri="{FF2B5EF4-FFF2-40B4-BE49-F238E27FC236}">
-                <a16:creationId xmlns:a16="http://schemas.microsoft.com/office/drawing/2014/main" id="{081DC6EB-1E80-49B1-B577-AA3E12AF1BCA}"/>
-              </a:ext>
-            </a:extLst>
-          </p:cNvPr>
-          <p:cNvSpPr>
-            <a:spLocks noGrp="1"/>
-          </p:cNvSpPr>
-          <p:nvPr>
-            <p:ph sz="half" idx="2"/>
-          </p:nvPr>
-        </p:nvSpPr>
-        <p:spPr/>
-        <p:txBody>
-          <a:bodyPr/>
-          <a:lstStyle/>
-          <a:p>
-            <a:r>
-              <a:rPr lang="en-US" dirty="0"/>
-              <a:t>Open location of downloaded file</a:t>
-            </a:r>
-          </a:p>
-          <a:p>
-            <a:r>
-              <a:rPr lang="en-US" dirty="0"/>
-              <a:t>Move file to safe location for storage</a:t>
-            </a:r>
-            <a:r>
-              <a:rPr lang="en-CA" dirty="0"/>
-              <a:t> (we will need this later)</a:t>
-            </a:r>
-          </a:p>
-        </p:txBody>
-      </p:sp>
     </p:spTree>
     <p:extLst>
       <p:ext uri="{BB962C8B-B14F-4D97-AF65-F5344CB8AC3E}">
-        <p14:creationId xmlns:p14="http://schemas.microsoft.com/office/powerpoint/2010/main" val="4202657972"/>
+        <p14:creationId xmlns:p14="http://schemas.microsoft.com/office/powerpoint/2010/main" val="3560187545"/>
       </p:ext>
     </p:extLst>
   </p:cSld>
@@ -15731,10 +15890,10 @@
       </p:grpSpPr>
       <p:sp>
         <p:nvSpPr>
-          <p:cNvPr id="2" name="Title 1">
+          <p:cNvPr id="5" name="Title 4">
             <a:extLst>
               <a:ext uri="{FF2B5EF4-FFF2-40B4-BE49-F238E27FC236}">
-                <a16:creationId xmlns:a16="http://schemas.microsoft.com/office/drawing/2014/main" id="{EE85C323-4018-4E77-8E62-60F0CB50B799}"/>
+                <a16:creationId xmlns:a16="http://schemas.microsoft.com/office/drawing/2014/main" id="{9390303D-036A-4A09-97B9-31455C4A39EB}"/>
               </a:ext>
             </a:extLst>
           </p:cNvPr>
@@ -15752,21 +15911,47 @@
           <a:p>
             <a:r>
               <a:rPr lang="en-US" dirty="0"/>
-              <a:t>Class Activity 01 – AWS Ec2 Instance Basics Workshop</a:t>
+              <a:t>Creating Amazon Ec2 Key Pairs (Cont’d)</a:t>
             </a:r>
-            <a:br>
-              <a:rPr lang="en-US" dirty="0"/>
-            </a:br>
             <a:endParaRPr lang="en-CA" dirty="0"/>
           </a:p>
         </p:txBody>
       </p:sp>
+      <p:pic>
+        <p:nvPicPr>
+          <p:cNvPr id="4" name="Content Placeholder 3" descr="A screenshot of a computer&#10;&#10;Description generated with very high confidence">
+            <a:extLst>
+              <a:ext uri="{FF2B5EF4-FFF2-40B4-BE49-F238E27FC236}">
+                <a16:creationId xmlns:a16="http://schemas.microsoft.com/office/drawing/2014/main" id="{94895701-F223-4B3B-B014-95572B06AAEB}"/>
+              </a:ext>
+            </a:extLst>
+          </p:cNvPr>
+          <p:cNvPicPr>
+            <a:picLocks noGrp="1" noChangeAspect="1"/>
+          </p:cNvPicPr>
+          <p:nvPr>
+            <p:ph sz="half" idx="1"/>
+          </p:nvPr>
+        </p:nvPicPr>
+        <p:blipFill>
+          <a:blip r:embed="rId3"/>
+          <a:stretch>
+            <a:fillRect/>
+          </a:stretch>
+        </p:blipFill>
+        <p:spPr>
+          <a:xfrm>
+            <a:off x="1141413" y="2460373"/>
+            <a:ext cx="4878387" cy="3119941"/>
+          </a:xfrm>
+        </p:spPr>
+      </p:pic>
       <p:sp>
         <p:nvSpPr>
-          <p:cNvPr id="3" name="Text Placeholder 2">
+          <p:cNvPr id="6" name="Content Placeholder 5">
             <a:extLst>
               <a:ext uri="{FF2B5EF4-FFF2-40B4-BE49-F238E27FC236}">
-                <a16:creationId xmlns:a16="http://schemas.microsoft.com/office/drawing/2014/main" id="{48B221F8-55A8-4568-AD15-0153F5471B2E}"/>
+                <a16:creationId xmlns:a16="http://schemas.microsoft.com/office/drawing/2014/main" id="{081DC6EB-1E80-49B1-B577-AA3E12AF1BCA}"/>
               </a:ext>
             </a:extLst>
           </p:cNvPr>
@@ -15774,7 +15959,7 @@
             <a:spLocks noGrp="1"/>
           </p:cNvSpPr>
           <p:nvPr>
-            <p:ph type="body" idx="1"/>
+            <p:ph sz="half" idx="2"/>
           </p:nvPr>
         </p:nvSpPr>
         <p:spPr/>
@@ -15784,16 +15969,25 @@
           <a:p>
             <a:r>
               <a:rPr lang="en-US" dirty="0"/>
-              <a:t>Launch EC2 Instance</a:t>
+              <a:t>Open location of downloaded file</a:t>
             </a:r>
-            <a:endParaRPr lang="en-CA" dirty="0"/>
+          </a:p>
+          <a:p>
+            <a:r>
+              <a:rPr lang="en-US" dirty="0"/>
+              <a:t>Move file to safe location for storage</a:t>
+            </a:r>
+            <a:r>
+              <a:rPr lang="en-CA" dirty="0"/>
+              <a:t> (we will need this later)</a:t>
+            </a:r>
           </a:p>
         </p:txBody>
       </p:sp>
     </p:spTree>
     <p:extLst>
       <p:ext uri="{BB962C8B-B14F-4D97-AF65-F5344CB8AC3E}">
-        <p14:creationId xmlns:p14="http://schemas.microsoft.com/office/powerpoint/2010/main" val="3528769916"/>
+        <p14:creationId xmlns:p14="http://schemas.microsoft.com/office/powerpoint/2010/main" val="4202657972"/>
       </p:ext>
     </p:extLst>
   </p:cSld>
@@ -15822,10 +16016,10 @@
       </p:grpSpPr>
       <p:sp>
         <p:nvSpPr>
-          <p:cNvPr id="5" name="Title 4">
+          <p:cNvPr id="2" name="Title 1">
             <a:extLst>
               <a:ext uri="{FF2B5EF4-FFF2-40B4-BE49-F238E27FC236}">
-                <a16:creationId xmlns:a16="http://schemas.microsoft.com/office/drawing/2014/main" id="{9390303D-036A-4A09-97B9-31455C4A39EB}"/>
+                <a16:creationId xmlns:a16="http://schemas.microsoft.com/office/drawing/2014/main" id="{EE85C323-4018-4E77-8E62-60F0CB50B799}"/>
               </a:ext>
             </a:extLst>
           </p:cNvPr>
@@ -15843,45 +16037,48 @@
           <a:p>
             <a:r>
               <a:rPr lang="en-US" dirty="0"/>
+              <a:t>Class Activity 01 – AWS Ec2 Instance Basics Workshop</a:t>
+            </a:r>
+            <a:br>
+              <a:rPr lang="en-US" dirty="0"/>
+            </a:br>
+            <a:endParaRPr lang="en-CA" dirty="0"/>
+          </a:p>
+        </p:txBody>
+      </p:sp>
+      <p:sp>
+        <p:nvSpPr>
+          <p:cNvPr id="3" name="Text Placeholder 2">
+            <a:extLst>
+              <a:ext uri="{FF2B5EF4-FFF2-40B4-BE49-F238E27FC236}">
+                <a16:creationId xmlns:a16="http://schemas.microsoft.com/office/drawing/2014/main" id="{48B221F8-55A8-4568-AD15-0153F5471B2E}"/>
+              </a:ext>
+            </a:extLst>
+          </p:cNvPr>
+          <p:cNvSpPr>
+            <a:spLocks noGrp="1"/>
+          </p:cNvSpPr>
+          <p:nvPr>
+            <p:ph type="body" idx="1"/>
+          </p:nvPr>
+        </p:nvSpPr>
+        <p:spPr/>
+        <p:txBody>
+          <a:bodyPr/>
+          <a:lstStyle/>
+          <a:p>
+            <a:r>
+              <a:rPr lang="en-US" dirty="0"/>
               <a:t>Launch EC2 Instance</a:t>
             </a:r>
             <a:endParaRPr lang="en-CA" dirty="0"/>
           </a:p>
         </p:txBody>
       </p:sp>
-      <p:pic>
-        <p:nvPicPr>
-          <p:cNvPr id="4" name="Content Placeholder 3" descr="A screenshot of a social media post&#10;&#10;Description generated with very high confidence">
-            <a:extLst>
-              <a:ext uri="{FF2B5EF4-FFF2-40B4-BE49-F238E27FC236}">
-                <a16:creationId xmlns:a16="http://schemas.microsoft.com/office/drawing/2014/main" id="{9AD40995-2CFC-4BE3-84B1-D24296926452}"/>
-              </a:ext>
-            </a:extLst>
-          </p:cNvPr>
-          <p:cNvPicPr>
-            <a:picLocks noGrp="1" noChangeAspect="1"/>
-          </p:cNvPicPr>
-          <p:nvPr>
-            <p:ph idx="1"/>
-          </p:nvPr>
-        </p:nvPicPr>
-        <p:blipFill>
-          <a:blip r:embed="rId2"/>
-          <a:stretch>
-            <a:fillRect/>
-          </a:stretch>
-        </p:blipFill>
-        <p:spPr>
-          <a:xfrm>
-            <a:off x="1488242" y="1741488"/>
-            <a:ext cx="9212340" cy="4689792"/>
-          </a:xfrm>
-        </p:spPr>
-      </p:pic>
     </p:spTree>
     <p:extLst>
       <p:ext uri="{BB962C8B-B14F-4D97-AF65-F5344CB8AC3E}">
-        <p14:creationId xmlns:p14="http://schemas.microsoft.com/office/powerpoint/2010/main" val="358460276"/>
+        <p14:creationId xmlns:p14="http://schemas.microsoft.com/office/powerpoint/2010/main" val="3528769916"/>
       </p:ext>
     </p:extLst>
   </p:cSld>

</xml_diff>